<commit_message>
Building final YA dataset
</commit_message>
<xml_diff>
--- a/Lab Meeting 10_28_21.pptx
+++ b/Lab Meeting 10_28_21.pptx
@@ -5,25 +5,26 @@
     <p:sldMasterId id="2147483660" r:id="rId1"/>
   </p:sldMasterIdLst>
   <p:notesMasterIdLst>
-    <p:notesMasterId r:id="rId18"/>
+    <p:notesMasterId r:id="rId19"/>
   </p:notesMasterIdLst>
   <p:sldIdLst>
-    <p:sldId id="326" r:id="rId2"/>
-    <p:sldId id="345" r:id="rId3"/>
-    <p:sldId id="316" r:id="rId4"/>
-    <p:sldId id="346" r:id="rId5"/>
-    <p:sldId id="337" r:id="rId6"/>
-    <p:sldId id="257" r:id="rId7"/>
-    <p:sldId id="258" r:id="rId8"/>
-    <p:sldId id="259" r:id="rId9"/>
-    <p:sldId id="260" r:id="rId10"/>
-    <p:sldId id="256" r:id="rId11"/>
-    <p:sldId id="261" r:id="rId12"/>
-    <p:sldId id="262" r:id="rId13"/>
+    <p:sldId id="347" r:id="rId2"/>
+    <p:sldId id="344" r:id="rId3"/>
+    <p:sldId id="345" r:id="rId4"/>
+    <p:sldId id="316" r:id="rId5"/>
+    <p:sldId id="257" r:id="rId6"/>
+    <p:sldId id="258" r:id="rId7"/>
+    <p:sldId id="259" r:id="rId8"/>
+    <p:sldId id="260" r:id="rId9"/>
+    <p:sldId id="256" r:id="rId10"/>
+    <p:sldId id="261" r:id="rId11"/>
+    <p:sldId id="262" r:id="rId12"/>
+    <p:sldId id="348" r:id="rId13"/>
     <p:sldId id="263" r:id="rId14"/>
-    <p:sldId id="264" r:id="rId15"/>
-    <p:sldId id="265" r:id="rId16"/>
-    <p:sldId id="266" r:id="rId17"/>
+    <p:sldId id="349" r:id="rId15"/>
+    <p:sldId id="264" r:id="rId16"/>
+    <p:sldId id="265" r:id="rId17"/>
+    <p:sldId id="266" r:id="rId18"/>
   </p:sldIdLst>
   <p:sldSz cx="9144000" cy="6858000" type="screen4x3"/>
   <p:notesSz cx="6858000" cy="9144000"/>
@@ -122,7 +123,56 @@
       </a:defRPr>
     </a:lvl9pPr>
   </p:defaultTextStyle>
+  <p:extLst>
+    <p:ext uri="{EFAFB233-063F-42B5-8137-9DF3F51BA10A}">
+      <p15:sldGuideLst xmlns:p15="http://schemas.microsoft.com/office/powerpoint/2012/main"/>
+    </p:ext>
+  </p:extLst>
 </p:presentation>
+</file>
+
+<file path=ppt/commentAuthors.xml><?xml version="1.0" encoding="utf-8"?>
+<p:cmAuthorLst xmlns:a="http://schemas.openxmlformats.org/drawingml/2006/main" xmlns:r="http://schemas.openxmlformats.org/officeDocument/2006/relationships" xmlns:p="http://schemas.openxmlformats.org/presentationml/2006/main">
+  <p:cmAuthor id="1" name="Jacob Namias" initials="JN" lastIdx="1" clrIdx="0">
+    <p:extLst>
+      <p:ext uri="{19B8F6BF-5375-455C-9EA6-DF929625EA0E}">
+        <p15:presenceInfo xmlns:p15="http://schemas.microsoft.com/office/powerpoint/2012/main" userId="8efcecdf084cf56a" providerId="Windows Live"/>
+      </p:ext>
+    </p:extLst>
+  </p:cmAuthor>
+  <p:cmAuthor id="2" name="Mark Huff" initials="MH" lastIdx="1" clrIdx="1">
+    <p:extLst>
+      <p:ext uri="{19B8F6BF-5375-455C-9EA6-DF929625EA0E}">
+        <p15:presenceInfo xmlns:p15="http://schemas.microsoft.com/office/powerpoint/2012/main" userId="Mark Huff" providerId="None"/>
+      </p:ext>
+    </p:extLst>
+  </p:cmAuthor>
+</p:cmAuthorLst>
+</file>
+
+<file path=ppt/comments/comment1.xml><?xml version="1.0" encoding="utf-8"?>
+<p:cmLst xmlns:a="http://schemas.openxmlformats.org/drawingml/2006/main" xmlns:r="http://schemas.openxmlformats.org/officeDocument/2006/relationships" xmlns:p="http://schemas.openxmlformats.org/presentationml/2006/main">
+  <p:cm authorId="1" dt="2020-10-08T11:03:23.052" idx="1">
+    <p:pos x="5708" y="3647"/>
+    <p:text>Could not find any old data tables in Nicks Powerpoint.</p:text>
+    <p:extLst>
+      <p:ext uri="{C676402C-5697-4E1C-873F-D02D1690AC5C}">
+        <p15:threadingInfo xmlns:p15="http://schemas.microsoft.com/office/powerpoint/2012/main" timeZoneBias="300"/>
+      </p:ext>
+    </p:extLst>
+  </p:cm>
+  <p:cm authorId="2" dt="2020-10-08T21:24:44.185" idx="1">
+    <p:pos x="5708" y="3743"/>
+    <p:text>You'll have to go to the original paper. Just take a snapshot out of the .pdf. You can find the paper on the lab website.</p:text>
+    <p:extLst>
+      <p:ext uri="{C676402C-5697-4E1C-873F-D02D1690AC5C}">
+        <p15:threadingInfo xmlns:p15="http://schemas.microsoft.com/office/powerpoint/2012/main" timeZoneBias="300">
+          <p15:parentCm authorId="1" idx="1"/>
+        </p15:threadingInfo>
+      </p:ext>
+    </p:extLst>
+  </p:cm>
+</p:cmLst>
 </file>
 
 <file path=ppt/notesMasters/notesMaster1.xml><?xml version="1.0" encoding="utf-8"?>
@@ -207,7 +257,7 @@
           <a:p>
             <a:fld id="{D610529E-5A3D-4BE2-B307-CCC850860F5E}" type="datetimeFigureOut">
               <a:rPr lang="en-US" smtClean="0"/>
-              <a:t>10/27/2021</a:t>
+              <a:t>10/28/2021</a:t>
             </a:fld>
             <a:endParaRPr lang="en-US"/>
           </a:p>
@@ -501,12 +551,7 @@
             <p:ph type="sldImg"/>
           </p:nvPr>
         </p:nvSpPr>
-        <p:spPr>
-          <a:xfrm>
-            <a:off x="1371600" y="1143000"/>
-            <a:ext cx="4114800" cy="3086100"/>
-          </a:xfrm>
-        </p:spPr>
+        <p:spPr/>
       </p:sp>
       <p:sp>
         <p:nvSpPr>
@@ -523,6 +568,52 @@
           <a:bodyPr/>
           <a:lstStyle/>
           <a:p>
+            <a:pPr lvl="1"/>
+            <a:r>
+              <a:rPr lang="en-US" dirty="0"/>
+              <a:t>Task set reconfiguration is the amount of time it takes to change task goals. So from CV,CV to CV,OE here we are only looking at the switch block</a:t>
+            </a:r>
+          </a:p>
+          <a:p>
+            <a:pPr lvl="1"/>
+            <a:endParaRPr lang="en-US" dirty="0"/>
+          </a:p>
+          <a:p>
+            <a:pPr lvl="1"/>
+            <a:r>
+              <a:rPr lang="en-US" dirty="0"/>
+              <a:t>Think of task set maintenance as measuring differences in maintaining multiple configurations versus only one configuration so CV,OE,CV to CV,CV,CV and here its in the switch vs pure blocks</a:t>
+            </a:r>
+          </a:p>
+          <a:p>
+            <a:pPr lvl="1"/>
+            <a:endParaRPr lang="en-US" dirty="0"/>
+          </a:p>
+          <a:p>
+            <a:pPr marL="457200" marR="0" lvl="1" indent="0" algn="l" defTabSz="914400" rtl="0" eaLnBrk="1" fontAlgn="auto" latinLnBrk="0" hangingPunct="1">
+              <a:lnSpc>
+                <a:spcPct val="100000"/>
+              </a:lnSpc>
+              <a:spcBef>
+                <a:spcPts val="0"/>
+              </a:spcBef>
+              <a:spcAft>
+                <a:spcPts val="0"/>
+              </a:spcAft>
+              <a:buClrTx/>
+              <a:buSzTx/>
+              <a:buFontTx/>
+              <a:buNone/>
+              <a:tabLst/>
+              <a:defRPr/>
+            </a:pPr>
+            <a:r>
+              <a:rPr lang="en-US" dirty="0"/>
+              <a:t>The results in the study showed a decrease in local costs and an increase in global cost across age groups</a:t>
+            </a:r>
+          </a:p>
+          <a:p>
+            <a:pPr lvl="1"/>
             <a:endParaRPr lang="en-US" dirty="0"/>
           </a:p>
         </p:txBody>
@@ -542,9 +633,9 @@
           <a:bodyPr/>
           <a:lstStyle/>
           <a:p>
-            <a:fld id="{138894ED-2154-4FF6-9548-4D9D74B3FA49}" type="slidenum">
+            <a:fld id="{C87A4DF1-EA0A-4B73-871B-436D37B677D5}" type="slidenum">
               <a:rPr lang="en-US" smtClean="0"/>
-              <a:t>2</a:t>
+              <a:t>1</a:t>
             </a:fld>
             <a:endParaRPr lang="en-US"/>
           </a:p>
@@ -553,7 +644,7 @@
     </p:spTree>
     <p:extLst>
       <p:ext uri="{BB962C8B-B14F-4D97-AF65-F5344CB8AC3E}">
-        <p14:creationId xmlns:p14="http://schemas.microsoft.com/office/powerpoint/2010/main" val="549101551"/>
+        <p14:creationId xmlns:p14="http://schemas.microsoft.com/office/powerpoint/2010/main" val="1342884062"/>
       </p:ext>
     </p:extLst>
   </p:cSld>
@@ -634,6 +725,95 @@
             <a:fld id="{138894ED-2154-4FF6-9548-4D9D74B3FA49}" type="slidenum">
               <a:rPr lang="en-US" smtClean="0"/>
               <a:t>3</a:t>
+            </a:fld>
+            <a:endParaRPr lang="en-US"/>
+          </a:p>
+        </p:txBody>
+      </p:sp>
+    </p:spTree>
+    <p:extLst>
+      <p:ext uri="{BB962C8B-B14F-4D97-AF65-F5344CB8AC3E}">
+        <p14:creationId xmlns:p14="http://schemas.microsoft.com/office/powerpoint/2010/main" val="549101551"/>
+      </p:ext>
+    </p:extLst>
+  </p:cSld>
+  <p:clrMapOvr>
+    <a:masterClrMapping/>
+  </p:clrMapOvr>
+</p:notes>
+</file>
+
+<file path=ppt/notesSlides/notesSlide3.xml><?xml version="1.0" encoding="utf-8"?>
+<p:notes xmlns:a="http://schemas.openxmlformats.org/drawingml/2006/main" xmlns:r="http://schemas.openxmlformats.org/officeDocument/2006/relationships" xmlns:p="http://schemas.openxmlformats.org/presentationml/2006/main">
+  <p:cSld>
+    <p:spTree>
+      <p:nvGrpSpPr>
+        <p:cNvPr id="1" name=""/>
+        <p:cNvGrpSpPr/>
+        <p:nvPr/>
+      </p:nvGrpSpPr>
+      <p:grpSpPr>
+        <a:xfrm>
+          <a:off x="0" y="0"/>
+          <a:ext cx="0" cy="0"/>
+          <a:chOff x="0" y="0"/>
+          <a:chExt cx="0" cy="0"/>
+        </a:xfrm>
+      </p:grpSpPr>
+      <p:sp>
+        <p:nvSpPr>
+          <p:cNvPr id="2" name="Slide Image Placeholder 1"/>
+          <p:cNvSpPr>
+            <a:spLocks noGrp="1" noRot="1" noChangeAspect="1"/>
+          </p:cNvSpPr>
+          <p:nvPr>
+            <p:ph type="sldImg"/>
+          </p:nvPr>
+        </p:nvSpPr>
+        <p:spPr>
+          <a:xfrm>
+            <a:off x="1371600" y="1143000"/>
+            <a:ext cx="4114800" cy="3086100"/>
+          </a:xfrm>
+        </p:spPr>
+      </p:sp>
+      <p:sp>
+        <p:nvSpPr>
+          <p:cNvPr id="3" name="Notes Placeholder 2"/>
+          <p:cNvSpPr>
+            <a:spLocks noGrp="1"/>
+          </p:cNvSpPr>
+          <p:nvPr>
+            <p:ph type="body" idx="1"/>
+          </p:nvPr>
+        </p:nvSpPr>
+        <p:spPr/>
+        <p:txBody>
+          <a:bodyPr/>
+          <a:lstStyle/>
+          <a:p>
+            <a:endParaRPr lang="en-US" dirty="0"/>
+          </a:p>
+        </p:txBody>
+      </p:sp>
+      <p:sp>
+        <p:nvSpPr>
+          <p:cNvPr id="4" name="Slide Number Placeholder 3"/>
+          <p:cNvSpPr>
+            <a:spLocks noGrp="1"/>
+          </p:cNvSpPr>
+          <p:nvPr>
+            <p:ph type="sldNum" sz="quarter" idx="5"/>
+          </p:nvPr>
+        </p:nvSpPr>
+        <p:spPr/>
+        <p:txBody>
+          <a:bodyPr/>
+          <a:lstStyle/>
+          <a:p>
+            <a:fld id="{138894ED-2154-4FF6-9548-4D9D74B3FA49}" type="slidenum">
+              <a:rPr lang="en-US" smtClean="0"/>
+              <a:t>4</a:t>
             </a:fld>
             <a:endParaRPr lang="en-US"/>
           </a:p>
@@ -783,7 +963,7 @@
           <a:p>
             <a:fld id="{4F6EE943-DCE0-41E4-A47A-4860EC854862}" type="datetimeFigureOut">
               <a:rPr lang="en-US" smtClean="0"/>
-              <a:t>10/27/2021</a:t>
+              <a:t>10/28/2021</a:t>
             </a:fld>
             <a:endParaRPr lang="en-US"/>
           </a:p>
@@ -953,7 +1133,7 @@
           <a:p>
             <a:fld id="{4F6EE943-DCE0-41E4-A47A-4860EC854862}" type="datetimeFigureOut">
               <a:rPr lang="en-US" smtClean="0"/>
-              <a:t>10/27/2021</a:t>
+              <a:t>10/28/2021</a:t>
             </a:fld>
             <a:endParaRPr lang="en-US"/>
           </a:p>
@@ -1133,7 +1313,7 @@
           <a:p>
             <a:fld id="{4F6EE943-DCE0-41E4-A47A-4860EC854862}" type="datetimeFigureOut">
               <a:rPr lang="en-US" smtClean="0"/>
-              <a:t>10/27/2021</a:t>
+              <a:t>10/28/2021</a:t>
             </a:fld>
             <a:endParaRPr lang="en-US"/>
           </a:p>
@@ -1303,7 +1483,7 @@
           <a:p>
             <a:fld id="{4F6EE943-DCE0-41E4-A47A-4860EC854862}" type="datetimeFigureOut">
               <a:rPr lang="en-US" smtClean="0"/>
-              <a:t>10/27/2021</a:t>
+              <a:t>10/28/2021</a:t>
             </a:fld>
             <a:endParaRPr lang="en-US"/>
           </a:p>
@@ -1547,7 +1727,7 @@
           <a:p>
             <a:fld id="{4F6EE943-DCE0-41E4-A47A-4860EC854862}" type="datetimeFigureOut">
               <a:rPr lang="en-US" smtClean="0"/>
-              <a:t>10/27/2021</a:t>
+              <a:t>10/28/2021</a:t>
             </a:fld>
             <a:endParaRPr lang="en-US"/>
           </a:p>
@@ -1779,7 +1959,7 @@
           <a:p>
             <a:fld id="{4F6EE943-DCE0-41E4-A47A-4860EC854862}" type="datetimeFigureOut">
               <a:rPr lang="en-US" smtClean="0"/>
-              <a:t>10/27/2021</a:t>
+              <a:t>10/28/2021</a:t>
             </a:fld>
             <a:endParaRPr lang="en-US"/>
           </a:p>
@@ -2146,7 +2326,7 @@
           <a:p>
             <a:fld id="{4F6EE943-DCE0-41E4-A47A-4860EC854862}" type="datetimeFigureOut">
               <a:rPr lang="en-US" smtClean="0"/>
-              <a:t>10/27/2021</a:t>
+              <a:t>10/28/2021</a:t>
             </a:fld>
             <a:endParaRPr lang="en-US"/>
           </a:p>
@@ -2264,7 +2444,7 @@
           <a:p>
             <a:fld id="{4F6EE943-DCE0-41E4-A47A-4860EC854862}" type="datetimeFigureOut">
               <a:rPr lang="en-US" smtClean="0"/>
-              <a:t>10/27/2021</a:t>
+              <a:t>10/28/2021</a:t>
             </a:fld>
             <a:endParaRPr lang="en-US"/>
           </a:p>
@@ -2359,7 +2539,7 @@
           <a:p>
             <a:fld id="{4F6EE943-DCE0-41E4-A47A-4860EC854862}" type="datetimeFigureOut">
               <a:rPr lang="en-US" smtClean="0"/>
-              <a:t>10/27/2021</a:t>
+              <a:t>10/28/2021</a:t>
             </a:fld>
             <a:endParaRPr lang="en-US"/>
           </a:p>
@@ -2636,7 +2816,7 @@
           <a:p>
             <a:fld id="{4F6EE943-DCE0-41E4-A47A-4860EC854862}" type="datetimeFigureOut">
               <a:rPr lang="en-US" smtClean="0"/>
-              <a:t>10/27/2021</a:t>
+              <a:t>10/28/2021</a:t>
             </a:fld>
             <a:endParaRPr lang="en-US"/>
           </a:p>
@@ -2893,7 +3073,7 @@
           <a:p>
             <a:fld id="{4F6EE943-DCE0-41E4-A47A-4860EC854862}" type="datetimeFigureOut">
               <a:rPr lang="en-US" smtClean="0"/>
-              <a:t>10/27/2021</a:t>
+              <a:t>10/28/2021</a:t>
             </a:fld>
             <a:endParaRPr lang="en-US"/>
           </a:p>
@@ -3106,7 +3286,7 @@
           <a:p>
             <a:fld id="{4F6EE943-DCE0-41E4-A47A-4860EC854862}" type="datetimeFigureOut">
               <a:rPr lang="en-US" smtClean="0"/>
-              <a:t>10/27/2021</a:t>
+              <a:t>10/28/2021</a:t>
             </a:fld>
             <a:endParaRPr lang="en-US"/>
           </a:p>
@@ -3516,7 +3696,7 @@
           <p:cNvPr id="2" name="Title 1">
             <a:extLst>
               <a:ext uri="{FF2B5EF4-FFF2-40B4-BE49-F238E27FC236}">
-                <a16:creationId xmlns:a16="http://schemas.microsoft.com/office/drawing/2014/main" id="{729CE9C9-59FE-48E3-A2FD-27ABC6F60FAE}"/>
+                <a16:creationId xmlns:a16="http://schemas.microsoft.com/office/drawing/2014/main" id="{57A2D056-985E-44E2-B314-898F2A006CDA}"/>
               </a:ext>
             </a:extLst>
           </p:cNvPr>
@@ -3527,14 +3707,23 @@
             <p:ph type="title"/>
           </p:nvPr>
         </p:nvSpPr>
-        <p:spPr/>
-        <p:txBody>
-          <a:bodyPr/>
-          <a:lstStyle/>
-          <a:p>
-            <a:r>
-              <a:rPr lang="en-US" b="1" dirty="0"/>
-              <a:t>Block Types</a:t>
+        <p:spPr>
+          <a:xfrm>
+            <a:off x="355921" y="1131094"/>
+            <a:ext cx="8159429" cy="979832"/>
+          </a:xfrm>
+        </p:spPr>
+        <p:txBody>
+          <a:bodyPr>
+            <a:normAutofit/>
+          </a:bodyPr>
+          <a:lstStyle/>
+          <a:p>
+            <a:r>
+              <a:rPr lang="en-US" sz="3000" b="1" dirty="0">
+                <a:latin typeface="Calibri (Body)"/>
+              </a:rPr>
+              <a:t>Introduction</a:t>
             </a:r>
           </a:p>
         </p:txBody>
@@ -3544,7 +3733,7 @@
           <p:cNvPr id="3" name="Content Placeholder 2">
             <a:extLst>
               <a:ext uri="{FF2B5EF4-FFF2-40B4-BE49-F238E27FC236}">
-                <a16:creationId xmlns:a16="http://schemas.microsoft.com/office/drawing/2014/main" id="{3AC2A4AB-58E8-4E7D-B569-12585F6DA90A}"/>
+                <a16:creationId xmlns:a16="http://schemas.microsoft.com/office/drawing/2014/main" id="{6D6309DD-E320-4F2C-8DFB-59590AF2E797}"/>
               </a:ext>
             </a:extLst>
           </p:cNvPr>
@@ -3557,289 +3746,209 @@
         </p:nvSpPr>
         <p:spPr>
           <a:xfrm>
-            <a:off x="382966" y="1690689"/>
-            <a:ext cx="7493788" cy="3530600"/>
-          </a:xfrm>
-        </p:spPr>
-        <p:txBody>
-          <a:bodyPr/>
-          <a:lstStyle/>
-          <a:p>
-            <a:r>
-              <a:rPr lang="en-US" sz="2400" dirty="0">
+            <a:off x="173619" y="2110927"/>
+            <a:ext cx="4019557" cy="3698081"/>
+          </a:xfrm>
+        </p:spPr>
+        <p:txBody>
+          <a:bodyPr>
+            <a:normAutofit lnSpcReduction="10000"/>
+          </a:bodyPr>
+          <a:lstStyle/>
+          <a:p>
+            <a:r>
+              <a:rPr lang="en-US" sz="1350" dirty="0"/>
+              <a:t>Attentional task switching can be very useful for looking at age differences</a:t>
+            </a:r>
+          </a:p>
+          <a:p>
+            <a:r>
+              <a:rPr lang="en-US" sz="1350" dirty="0"/>
+              <a:t>The Consonant Vowel/Odd Even (CVOE) switch task provides participants with a bivalent stimulus         (O 27) with instruction to attend to either the letter or number and classify this as a consonant/vowel or an odd/even</a:t>
+            </a:r>
+          </a:p>
+          <a:p>
+            <a:pPr lvl="1"/>
+            <a:r>
+              <a:rPr lang="en-US" sz="1200" dirty="0"/>
+              <a:t>Pure Block vs Switch Block</a:t>
+            </a:r>
+          </a:p>
+          <a:p>
+            <a:pPr lvl="1"/>
+            <a:endParaRPr lang="en-US" sz="750" dirty="0"/>
+          </a:p>
+          <a:p>
+            <a:r>
+              <a:rPr lang="en-US" sz="1350" dirty="0"/>
+              <a:t>Huff et al. (2015) compared local and global switching costs across age groups and older adult with mild AD on RTs and errors</a:t>
+            </a:r>
+          </a:p>
+          <a:p>
+            <a:pPr lvl="1"/>
+            <a:r>
+              <a:rPr lang="en-US" sz="1200" b="1" dirty="0"/>
+              <a:t>Local Switch Costs </a:t>
+            </a:r>
+            <a:r>
+              <a:rPr lang="en-US" sz="1200" dirty="0"/>
+              <a:t>– switch trials minus non switch trials within the switch block, a </a:t>
+            </a:r>
+            <a:r>
+              <a:rPr lang="en-US" sz="1200" b="1" i="1" dirty="0"/>
+              <a:t>task-set reconfiguration </a:t>
+            </a:r>
+            <a:r>
+              <a:rPr lang="en-US" sz="1200" dirty="0"/>
+              <a:t>cost</a:t>
+            </a:r>
+          </a:p>
+          <a:p>
+            <a:pPr lvl="1"/>
+            <a:r>
+              <a:rPr lang="en-US" sz="1200" b="1" dirty="0"/>
+              <a:t>Global Switch Costs </a:t>
+            </a:r>
+            <a:r>
+              <a:rPr lang="en-US" sz="1200" dirty="0"/>
+              <a:t>- nonswitch trials minus pure trials, a </a:t>
+            </a:r>
+            <a:r>
+              <a:rPr lang="en-US" sz="1200" b="1" i="1" dirty="0"/>
+              <a:t>task-set maintenance </a:t>
+            </a:r>
+            <a:r>
+              <a:rPr lang="en-US" sz="1200" dirty="0"/>
+              <a:t>cost</a:t>
+            </a:r>
+          </a:p>
+          <a:p>
+            <a:pPr lvl="1"/>
+            <a:r>
+              <a:rPr lang="en-US" sz="1200" dirty="0"/>
+              <a:t>This was done using the alternating runs paradigm. (CV,CV,OE,OE,CV,CV…)</a:t>
+            </a:r>
+          </a:p>
+          <a:p>
+            <a:pPr lvl="1"/>
+            <a:endParaRPr lang="en-US" sz="1200" dirty="0"/>
+          </a:p>
+        </p:txBody>
+      </p:sp>
+      <p:pic>
+        <p:nvPicPr>
+          <p:cNvPr id="4" name="Picture 3">
+            <a:extLst>
+              <a:ext uri="{FF2B5EF4-FFF2-40B4-BE49-F238E27FC236}">
+                <a16:creationId xmlns:a16="http://schemas.microsoft.com/office/drawing/2014/main" id="{14AAD321-2183-4B69-87F5-FD0E24A823FA}"/>
+              </a:ext>
+            </a:extLst>
+          </p:cNvPr>
+          <p:cNvPicPr>
+            <a:picLocks noChangeAspect="1"/>
+          </p:cNvPicPr>
+          <p:nvPr/>
+        </p:nvPicPr>
+        <p:blipFill rotWithShape="1">
+          <a:blip r:embed="rId3"/>
+          <a:srcRect l="-670"/>
+          <a:stretch/>
+        </p:blipFill>
+        <p:spPr>
+          <a:xfrm>
+            <a:off x="4067720" y="2375663"/>
+            <a:ext cx="5103711" cy="3168606"/>
+          </a:xfrm>
+          <a:prstGeom prst="rect">
+            <a:avLst/>
+          </a:prstGeom>
+        </p:spPr>
+      </p:pic>
+      <p:sp>
+        <p:nvSpPr>
+          <p:cNvPr id="5" name="TextBox 4">
+            <a:extLst>
+              <a:ext uri="{FF2B5EF4-FFF2-40B4-BE49-F238E27FC236}">
+                <a16:creationId xmlns:a16="http://schemas.microsoft.com/office/drawing/2014/main" id="{C1105F33-B730-4034-92FA-D6DCEBE7B3BB}"/>
+              </a:ext>
+            </a:extLst>
+          </p:cNvPr>
+          <p:cNvSpPr txBox="1"/>
+          <p:nvPr/>
+        </p:nvSpPr>
+        <p:spPr>
+          <a:xfrm>
+            <a:off x="5687571" y="2197151"/>
+            <a:ext cx="2332480" cy="323165"/>
+          </a:xfrm>
+          <a:prstGeom prst="rect">
+            <a:avLst/>
+          </a:prstGeom>
+          <a:noFill/>
+        </p:spPr>
+        <p:txBody>
+          <a:bodyPr wrap="square" rtlCol="0">
+            <a:spAutoFit/>
+          </a:bodyPr>
+          <a:lstStyle/>
+          <a:p>
+            <a:r>
+              <a:rPr lang="en-US" sz="1500" b="1" dirty="0"/>
+              <a:t>Huff et al. (2015) - Results</a:t>
+            </a:r>
+          </a:p>
+        </p:txBody>
+      </p:sp>
+      <p:sp>
+        <p:nvSpPr>
+          <p:cNvPr id="8" name="TextBox 7">
+            <a:extLst>
+              <a:ext uri="{FF2B5EF4-FFF2-40B4-BE49-F238E27FC236}">
+                <a16:creationId xmlns:a16="http://schemas.microsoft.com/office/drawing/2014/main" id="{26262DC8-5252-4367-BE75-C867D26BDC9B}"/>
+              </a:ext>
+            </a:extLst>
+          </p:cNvPr>
+          <p:cNvSpPr txBox="1"/>
+          <p:nvPr/>
+        </p:nvSpPr>
+        <p:spPr>
+          <a:xfrm>
+            <a:off x="-777240" y="5787643"/>
+            <a:ext cx="1905000" cy="300082"/>
+          </a:xfrm>
+          <a:prstGeom prst="rect">
+            <a:avLst/>
+          </a:prstGeom>
+          <a:noFill/>
+        </p:spPr>
+        <p:txBody>
+          <a:bodyPr wrap="square" rtlCol="0">
+            <a:spAutoFit/>
+          </a:bodyPr>
+          <a:lstStyle/>
+          <a:p>
+            <a:pPr algn="r"/>
+            <a:r>
+              <a:rPr lang="en-US" sz="1350" dirty="0">
                 <a:solidFill>
-                  <a:schemeClr val="tx1"/>
+                  <a:schemeClr val="accent3"/>
                 </a:solidFill>
               </a:rPr>
-              <a:t>Pure Blocks</a:t>
-            </a:r>
-          </a:p>
-          <a:p>
-            <a:pPr lvl="1"/>
-            <a:r>
-              <a:rPr lang="en-US" sz="2000" dirty="0">
-                <a:solidFill>
-                  <a:schemeClr val="tx1"/>
-                </a:solidFill>
-              </a:rPr>
-              <a:t>Participants focus on only one of the two tasks</a:t>
-            </a:r>
-          </a:p>
-          <a:p>
-            <a:pPr lvl="2"/>
-            <a:r>
-              <a:rPr lang="en-US" sz="1800" dirty="0">
-                <a:solidFill>
-                  <a:schemeClr val="tx1"/>
-                </a:solidFill>
-              </a:rPr>
-              <a:t>i.e., only doing the odd even task for all trials in a block</a:t>
-            </a:r>
-          </a:p>
-          <a:p>
-            <a:r>
-              <a:rPr lang="en-US" sz="2400" dirty="0">
-                <a:solidFill>
-                  <a:schemeClr val="tx1"/>
-                </a:solidFill>
-              </a:rPr>
-              <a:t>Switch Blocks</a:t>
-            </a:r>
-          </a:p>
-          <a:p>
-            <a:pPr lvl="1"/>
-            <a:r>
-              <a:rPr lang="en-US" sz="2000" dirty="0">
-                <a:solidFill>
-                  <a:schemeClr val="tx1"/>
-                </a:solidFill>
-              </a:rPr>
-              <a:t>Participants change task type for different trials in the same block.</a:t>
-            </a:r>
-          </a:p>
-          <a:p>
-            <a:endParaRPr lang="en-US" dirty="0"/>
+              <a:t>(2067) Namias</a:t>
+            </a:r>
           </a:p>
         </p:txBody>
       </p:sp>
     </p:spTree>
     <p:extLst>
       <p:ext uri="{BB962C8B-B14F-4D97-AF65-F5344CB8AC3E}">
-        <p14:creationId xmlns:p14="http://schemas.microsoft.com/office/powerpoint/2010/main" val="4216651486"/>
+        <p14:creationId xmlns:p14="http://schemas.microsoft.com/office/powerpoint/2010/main" val="4071779453"/>
       </p:ext>
     </p:extLst>
   </p:cSld>
   <p:clrMapOvr>
     <a:masterClrMapping/>
   </p:clrMapOvr>
-  <p:timing>
-    <p:tnLst>
-      <p:par>
-        <p:cTn id="1" dur="indefinite" restart="never" nodeType="tmRoot">
-          <p:childTnLst>
-            <p:seq concurrent="1" nextAc="seek">
-              <p:cTn id="2" dur="indefinite" nodeType="mainSeq">
-                <p:childTnLst>
-                  <p:par>
-                    <p:cTn id="3" fill="hold">
-                      <p:stCondLst>
-                        <p:cond delay="indefinite"/>
-                      </p:stCondLst>
-                      <p:childTnLst>
-                        <p:par>
-                          <p:cTn id="4" fill="hold">
-                            <p:stCondLst>
-                              <p:cond delay="0"/>
-                            </p:stCondLst>
-                            <p:childTnLst>
-                              <p:par>
-                                <p:cTn id="5" presetID="1" presetClass="entr" presetSubtype="0" fill="hold" nodeType="clickEffect">
-                                  <p:stCondLst>
-                                    <p:cond delay="0"/>
-                                  </p:stCondLst>
-                                  <p:childTnLst>
-                                    <p:set>
-                                      <p:cBhvr>
-                                        <p:cTn id="6" dur="1" fill="hold">
-                                          <p:stCondLst>
-                                            <p:cond delay="0"/>
-                                          </p:stCondLst>
-                                        </p:cTn>
-                                        <p:tgtEl>
-                                          <p:spTgt spid="3">
-                                            <p:txEl>
-                                              <p:pRg st="1" end="1"/>
-                                            </p:txEl>
-                                          </p:spTgt>
-                                        </p:tgtEl>
-                                        <p:attrNameLst>
-                                          <p:attrName>style.visibility</p:attrName>
-                                        </p:attrNameLst>
-                                      </p:cBhvr>
-                                      <p:to>
-                                        <p:strVal val="visible"/>
-                                      </p:to>
-                                    </p:set>
-                                  </p:childTnLst>
-                                </p:cTn>
-                              </p:par>
-                              <p:par>
-                                <p:cTn id="7" presetID="1" presetClass="entr" presetSubtype="0" fill="hold" nodeType="withEffect">
-                                  <p:stCondLst>
-                                    <p:cond delay="0"/>
-                                  </p:stCondLst>
-                                  <p:childTnLst>
-                                    <p:set>
-                                      <p:cBhvr>
-                                        <p:cTn id="8" dur="1" fill="hold">
-                                          <p:stCondLst>
-                                            <p:cond delay="0"/>
-                                          </p:stCondLst>
-                                        </p:cTn>
-                                        <p:tgtEl>
-                                          <p:spTgt spid="3">
-                                            <p:txEl>
-                                              <p:pRg st="2" end="2"/>
-                                            </p:txEl>
-                                          </p:spTgt>
-                                        </p:tgtEl>
-                                        <p:attrNameLst>
-                                          <p:attrName>style.visibility</p:attrName>
-                                        </p:attrNameLst>
-                                      </p:cBhvr>
-                                      <p:to>
-                                        <p:strVal val="visible"/>
-                                      </p:to>
-                                    </p:set>
-                                  </p:childTnLst>
-                                </p:cTn>
-                              </p:par>
-                            </p:childTnLst>
-                          </p:cTn>
-                        </p:par>
-                      </p:childTnLst>
-                    </p:cTn>
-                  </p:par>
-                  <p:par>
-                    <p:cTn id="9" fill="hold">
-                      <p:stCondLst>
-                        <p:cond delay="indefinite"/>
-                      </p:stCondLst>
-                      <p:childTnLst>
-                        <p:par>
-                          <p:cTn id="10" fill="hold">
-                            <p:stCondLst>
-                              <p:cond delay="0"/>
-                            </p:stCondLst>
-                            <p:childTnLst>
-                              <p:par>
-                                <p:cTn id="11" presetID="1" presetClass="entr" presetSubtype="0" fill="hold" nodeType="clickEffect">
-                                  <p:stCondLst>
-                                    <p:cond delay="0"/>
-                                  </p:stCondLst>
-                                  <p:childTnLst>
-                                    <p:set>
-                                      <p:cBhvr>
-                                        <p:cTn id="12" dur="1" fill="hold">
-                                          <p:stCondLst>
-                                            <p:cond delay="0"/>
-                                          </p:stCondLst>
-                                        </p:cTn>
-                                        <p:tgtEl>
-                                          <p:spTgt spid="3">
-                                            <p:txEl>
-                                              <p:pRg st="3" end="3"/>
-                                            </p:txEl>
-                                          </p:spTgt>
-                                        </p:tgtEl>
-                                        <p:attrNameLst>
-                                          <p:attrName>style.visibility</p:attrName>
-                                        </p:attrNameLst>
-                                      </p:cBhvr>
-                                      <p:to>
-                                        <p:strVal val="visible"/>
-                                      </p:to>
-                                    </p:set>
-                                  </p:childTnLst>
-                                </p:cTn>
-                              </p:par>
-                            </p:childTnLst>
-                          </p:cTn>
-                        </p:par>
-                      </p:childTnLst>
-                    </p:cTn>
-                  </p:par>
-                  <p:par>
-                    <p:cTn id="13" fill="hold">
-                      <p:stCondLst>
-                        <p:cond delay="indefinite"/>
-                      </p:stCondLst>
-                      <p:childTnLst>
-                        <p:par>
-                          <p:cTn id="14" fill="hold">
-                            <p:stCondLst>
-                              <p:cond delay="0"/>
-                            </p:stCondLst>
-                            <p:childTnLst>
-                              <p:par>
-                                <p:cTn id="15" presetID="1" presetClass="entr" presetSubtype="0" fill="hold" nodeType="clickEffect">
-                                  <p:stCondLst>
-                                    <p:cond delay="0"/>
-                                  </p:stCondLst>
-                                  <p:childTnLst>
-                                    <p:set>
-                                      <p:cBhvr>
-                                        <p:cTn id="16" dur="1" fill="hold">
-                                          <p:stCondLst>
-                                            <p:cond delay="0"/>
-                                          </p:stCondLst>
-                                        </p:cTn>
-                                        <p:tgtEl>
-                                          <p:spTgt spid="3">
-                                            <p:txEl>
-                                              <p:pRg st="4" end="4"/>
-                                            </p:txEl>
-                                          </p:spTgt>
-                                        </p:tgtEl>
-                                        <p:attrNameLst>
-                                          <p:attrName>style.visibility</p:attrName>
-                                        </p:attrNameLst>
-                                      </p:cBhvr>
-                                      <p:to>
-                                        <p:strVal val="visible"/>
-                                      </p:to>
-                                    </p:set>
-                                  </p:childTnLst>
-                                </p:cTn>
-                              </p:par>
-                            </p:childTnLst>
-                          </p:cTn>
-                        </p:par>
-                      </p:childTnLst>
-                    </p:cTn>
-                  </p:par>
-                </p:childTnLst>
-              </p:cTn>
-              <p:prevCondLst>
-                <p:cond evt="onPrev" delay="0">
-                  <p:tgtEl>
-                    <p:sldTgt/>
-                  </p:tgtEl>
-                </p:cond>
-              </p:prevCondLst>
-              <p:nextCondLst>
-                <p:cond evt="onNext" delay="0">
-                  <p:tgtEl>
-                    <p:sldTgt/>
-                  </p:tgtEl>
-                </p:cond>
-              </p:nextCondLst>
-            </p:seq>
-          </p:childTnLst>
-        </p:cTn>
-      </p:par>
-    </p:tnLst>
-  </p:timing>
 </p:sld>
 </file>
 
@@ -3860,12 +3969,55 @@
           <a:chExt cx="0" cy="0"/>
         </a:xfrm>
       </p:grpSpPr>
+      <p:sp>
+        <p:nvSpPr>
+          <p:cNvPr id="6" name="TextBox 5">
+            <a:extLst>
+              <a:ext uri="{FF2B5EF4-FFF2-40B4-BE49-F238E27FC236}">
+                <a16:creationId xmlns:a16="http://schemas.microsoft.com/office/drawing/2014/main" id="{A34046AC-7595-46B3-BA4B-2EC49B1966E6}"/>
+              </a:ext>
+            </a:extLst>
+          </p:cNvPr>
+          <p:cNvSpPr txBox="1"/>
+          <p:nvPr/>
+        </p:nvSpPr>
+        <p:spPr>
+          <a:xfrm>
+            <a:off x="2554015" y="221727"/>
+            <a:ext cx="5171089" cy="523220"/>
+          </a:xfrm>
+          <a:prstGeom prst="rect">
+            <a:avLst/>
+          </a:prstGeom>
+          <a:noFill/>
+        </p:spPr>
+        <p:txBody>
+          <a:bodyPr wrap="square" rtlCol="0">
+            <a:spAutoFit/>
+          </a:bodyPr>
+          <a:lstStyle/>
+          <a:p>
+            <a:r>
+              <a:rPr lang="en-US" sz="2800" b="1" dirty="0"/>
+              <a:t>All Groups </a:t>
+            </a:r>
+            <a:r>
+              <a:rPr lang="en-US" sz="2800" b="1" dirty="0" err="1"/>
+              <a:t>Vincentiles</a:t>
+            </a:r>
+            <a:r>
+              <a:rPr lang="en-US" sz="2800" b="1" dirty="0"/>
+              <a:t> -- Pure</a:t>
+            </a:r>
+          </a:p>
+        </p:txBody>
+      </p:sp>
       <p:pic>
         <p:nvPicPr>
-          <p:cNvPr id="5" name="Picture 4" descr="Chart&#10;&#10;Description automatically generated">
+          <p:cNvPr id="7" name="Picture 6">
             <a:extLst>
               <a:ext uri="{FF2B5EF4-FFF2-40B4-BE49-F238E27FC236}">
-                <a16:creationId xmlns:a16="http://schemas.microsoft.com/office/drawing/2014/main" id="{011E5029-70C3-4B0F-B1CA-0B15B87BE8F9}"/>
+                <a16:creationId xmlns:a16="http://schemas.microsoft.com/office/drawing/2014/main" id="{7EB75A6E-2D0C-460E-B582-6C0D682FA110}"/>
               </a:ext>
             </a:extLst>
           </p:cNvPr>
@@ -3875,71 +4027,25 @@
           <p:nvPr/>
         </p:nvPicPr>
         <p:blipFill>
-          <a:blip r:embed="rId2">
-            <a:extLst>
-              <a:ext uri="{28A0092B-C50C-407E-A947-70E740481C1C}">
-                <a14:useLocalDpi xmlns:a14="http://schemas.microsoft.com/office/drawing/2010/main" val="0"/>
-              </a:ext>
-            </a:extLst>
-          </a:blip>
+          <a:blip r:embed="rId2"/>
           <a:stretch>
             <a:fillRect/>
           </a:stretch>
         </p:blipFill>
         <p:spPr>
           <a:xfrm>
-            <a:off x="0" y="652652"/>
-            <a:ext cx="9144000" cy="6330461"/>
+            <a:off x="85725" y="1847851"/>
+            <a:ext cx="9058275" cy="2924175"/>
           </a:xfrm>
           <a:prstGeom prst="rect">
             <a:avLst/>
           </a:prstGeom>
         </p:spPr>
       </p:pic>
-      <p:sp>
-        <p:nvSpPr>
-          <p:cNvPr id="6" name="TextBox 5">
-            <a:extLst>
-              <a:ext uri="{FF2B5EF4-FFF2-40B4-BE49-F238E27FC236}">
-                <a16:creationId xmlns:a16="http://schemas.microsoft.com/office/drawing/2014/main" id="{A34046AC-7595-46B3-BA4B-2EC49B1966E6}"/>
-              </a:ext>
-            </a:extLst>
-          </p:cNvPr>
-          <p:cNvSpPr txBox="1"/>
-          <p:nvPr/>
-        </p:nvSpPr>
-        <p:spPr>
-          <a:xfrm>
-            <a:off x="2554015" y="221727"/>
-            <a:ext cx="5171089" cy="523220"/>
-          </a:xfrm>
-          <a:prstGeom prst="rect">
-            <a:avLst/>
-          </a:prstGeom>
-          <a:noFill/>
-        </p:spPr>
-        <p:txBody>
-          <a:bodyPr wrap="square" rtlCol="0">
-            <a:spAutoFit/>
-          </a:bodyPr>
-          <a:lstStyle/>
-          <a:p>
-            <a:r>
-              <a:rPr lang="en-US" sz="2800" b="1" dirty="0"/>
-              <a:t>Younger Adult </a:t>
-            </a:r>
-            <a:r>
-              <a:rPr lang="en-US" sz="2800" b="1" dirty="0" err="1"/>
-              <a:t>Vincentiles</a:t>
-            </a:r>
-            <a:endParaRPr lang="en-US" sz="2800" b="1" dirty="0"/>
-          </a:p>
-        </p:txBody>
-      </p:sp>
     </p:spTree>
     <p:extLst>
       <p:ext uri="{BB962C8B-B14F-4D97-AF65-F5344CB8AC3E}">
-        <p14:creationId xmlns:p14="http://schemas.microsoft.com/office/powerpoint/2010/main" val="937046088"/>
+        <p14:creationId xmlns:p14="http://schemas.microsoft.com/office/powerpoint/2010/main" val="1972376126"/>
       </p:ext>
     </p:extLst>
   </p:cSld>
@@ -4004,7 +4110,7 @@
             </a:r>
             <a:r>
               <a:rPr lang="en-US" sz="2800" b="1" dirty="0"/>
-              <a:t> -- Pure</a:t>
+              <a:t> – Alt Runs</a:t>
             </a:r>
           </a:p>
         </p:txBody>
@@ -4024,15 +4130,55 @@
           <p:nvPr/>
         </p:nvPicPr>
         <p:blipFill>
-          <a:blip r:embed="rId2"/>
-          <a:stretch>
-            <a:fillRect/>
-          </a:stretch>
+          <a:blip r:embed="rId2">
+            <a:extLst>
+              <a:ext uri="{28A0092B-C50C-407E-A947-70E740481C1C}">
+                <a14:useLocalDpi xmlns:a14="http://schemas.microsoft.com/office/drawing/2010/main" val="0"/>
+              </a:ext>
+            </a:extLst>
+          </a:blip>
+          <a:srcRect/>
+          <a:stretch/>
         </p:blipFill>
         <p:spPr>
           <a:xfrm>
-            <a:off x="85725" y="1847851"/>
-            <a:ext cx="9058275" cy="2924175"/>
+            <a:off x="85725" y="814203"/>
+            <a:ext cx="9058275" cy="2785662"/>
+          </a:xfrm>
+          <a:prstGeom prst="rect">
+            <a:avLst/>
+          </a:prstGeom>
+        </p:spPr>
+      </p:pic>
+      <p:pic>
+        <p:nvPicPr>
+          <p:cNvPr id="4" name="Picture 3">
+            <a:extLst>
+              <a:ext uri="{FF2B5EF4-FFF2-40B4-BE49-F238E27FC236}">
+                <a16:creationId xmlns:a16="http://schemas.microsoft.com/office/drawing/2014/main" id="{0834E3B8-EF52-454C-984E-C3637CF45C1B}"/>
+              </a:ext>
+            </a:extLst>
+          </p:cNvPr>
+          <p:cNvPicPr>
+            <a:picLocks noChangeAspect="1"/>
+          </p:cNvPicPr>
+          <p:nvPr/>
+        </p:nvPicPr>
+        <p:blipFill>
+          <a:blip r:embed="rId3">
+            <a:extLst>
+              <a:ext uri="{28A0092B-C50C-407E-A947-70E740481C1C}">
+                <a14:useLocalDpi xmlns:a14="http://schemas.microsoft.com/office/drawing/2010/main" val="0"/>
+              </a:ext>
+            </a:extLst>
+          </a:blip>
+          <a:srcRect/>
+          <a:stretch/>
+        </p:blipFill>
+        <p:spPr>
+          <a:xfrm>
+            <a:off x="0" y="3949210"/>
+            <a:ext cx="9058275" cy="2664198"/>
           </a:xfrm>
           <a:prstGeom prst="rect">
             <a:avLst/>
@@ -4042,7 +4188,7 @@
     </p:spTree>
     <p:extLst>
       <p:ext uri="{BB962C8B-B14F-4D97-AF65-F5344CB8AC3E}">
-        <p14:creationId xmlns:p14="http://schemas.microsoft.com/office/powerpoint/2010/main" val="1972376126"/>
+        <p14:creationId xmlns:p14="http://schemas.microsoft.com/office/powerpoint/2010/main" val="1365597571"/>
       </p:ext>
     </p:extLst>
   </p:cSld>
@@ -4174,8 +4320,8 @@
         </p:blipFill>
         <p:spPr>
           <a:xfrm>
-            <a:off x="0" y="3949210"/>
-            <a:ext cx="9058275" cy="2664198"/>
+            <a:off x="178589" y="3949210"/>
+            <a:ext cx="8701096" cy="2664198"/>
           </a:xfrm>
           <a:prstGeom prst="rect">
             <a:avLst/>
@@ -4185,7 +4331,7 @@
     </p:spTree>
     <p:extLst>
       <p:ext uri="{BB962C8B-B14F-4D97-AF65-F5344CB8AC3E}">
-        <p14:creationId xmlns:p14="http://schemas.microsoft.com/office/powerpoint/2010/main" val="1365597571"/>
+        <p14:creationId xmlns:p14="http://schemas.microsoft.com/office/powerpoint/2010/main" val="4163905266"/>
       </p:ext>
     </p:extLst>
   </p:cSld>
@@ -4355,12 +4501,55 @@
           <a:chExt cx="0" cy="0"/>
         </a:xfrm>
       </p:grpSpPr>
+      <p:sp>
+        <p:nvSpPr>
+          <p:cNvPr id="6" name="TextBox 5">
+            <a:extLst>
+              <a:ext uri="{FF2B5EF4-FFF2-40B4-BE49-F238E27FC236}">
+                <a16:creationId xmlns:a16="http://schemas.microsoft.com/office/drawing/2014/main" id="{A34046AC-7595-46B3-BA4B-2EC49B1966E6}"/>
+              </a:ext>
+            </a:extLst>
+          </p:cNvPr>
+          <p:cNvSpPr txBox="1"/>
+          <p:nvPr/>
+        </p:nvSpPr>
+        <p:spPr>
+          <a:xfrm>
+            <a:off x="2554015" y="221727"/>
+            <a:ext cx="5171089" cy="523220"/>
+          </a:xfrm>
+          <a:prstGeom prst="rect">
+            <a:avLst/>
+          </a:prstGeom>
+          <a:noFill/>
+        </p:spPr>
+        <p:txBody>
+          <a:bodyPr wrap="square" rtlCol="0">
+            <a:spAutoFit/>
+          </a:bodyPr>
+          <a:lstStyle/>
+          <a:p>
+            <a:r>
+              <a:rPr lang="en-US" sz="2800" b="1" dirty="0"/>
+              <a:t>All Groups </a:t>
+            </a:r>
+            <a:r>
+              <a:rPr lang="en-US" sz="2800" b="1" dirty="0" err="1"/>
+              <a:t>Vincentiles</a:t>
+            </a:r>
+            <a:r>
+              <a:rPr lang="en-US" sz="2800" b="1" dirty="0"/>
+              <a:t> – Random</a:t>
+            </a:r>
+          </a:p>
+        </p:txBody>
+      </p:sp>
       <p:pic>
         <p:nvPicPr>
-          <p:cNvPr id="3" name="Picture 2">
+          <p:cNvPr id="7" name="Picture 6">
             <a:extLst>
               <a:ext uri="{FF2B5EF4-FFF2-40B4-BE49-F238E27FC236}">
-                <a16:creationId xmlns:a16="http://schemas.microsoft.com/office/drawing/2014/main" id="{5D8AE060-5083-47C9-B225-18F877328F7E}"/>
+                <a16:creationId xmlns:a16="http://schemas.microsoft.com/office/drawing/2014/main" id="{7EB75A6E-2D0C-460E-B582-6C0D682FA110}"/>
               </a:ext>
             </a:extLst>
           </p:cNvPr>
@@ -4382,8 +4571,43 @@
         </p:blipFill>
         <p:spPr>
           <a:xfrm>
-            <a:off x="21199" y="910976"/>
-            <a:ext cx="9122801" cy="4426447"/>
+            <a:off x="85725" y="819955"/>
+            <a:ext cx="9058275" cy="2774159"/>
+          </a:xfrm>
+          <a:prstGeom prst="rect">
+            <a:avLst/>
+          </a:prstGeom>
+        </p:spPr>
+      </p:pic>
+      <p:pic>
+        <p:nvPicPr>
+          <p:cNvPr id="4" name="Picture 3">
+            <a:extLst>
+              <a:ext uri="{FF2B5EF4-FFF2-40B4-BE49-F238E27FC236}">
+                <a16:creationId xmlns:a16="http://schemas.microsoft.com/office/drawing/2014/main" id="{0834E3B8-EF52-454C-984E-C3637CF45C1B}"/>
+              </a:ext>
+            </a:extLst>
+          </p:cNvPr>
+          <p:cNvPicPr>
+            <a:picLocks noChangeAspect="1"/>
+          </p:cNvPicPr>
+          <p:nvPr/>
+        </p:nvPicPr>
+        <p:blipFill>
+          <a:blip r:embed="rId3">
+            <a:extLst>
+              <a:ext uri="{28A0092B-C50C-407E-A947-70E740481C1C}">
+                <a14:useLocalDpi xmlns:a14="http://schemas.microsoft.com/office/drawing/2010/main" val="0"/>
+              </a:ext>
+            </a:extLst>
+          </a:blip>
+          <a:srcRect/>
+          <a:stretch/>
+        </p:blipFill>
+        <p:spPr>
+          <a:xfrm>
+            <a:off x="165077" y="3925690"/>
+            <a:ext cx="8813844" cy="2710583"/>
           </a:xfrm>
           <a:prstGeom prst="rect">
             <a:avLst/>
@@ -4393,7 +4617,7 @@
     </p:spTree>
     <p:extLst>
       <p:ext uri="{BB962C8B-B14F-4D97-AF65-F5344CB8AC3E}">
-        <p14:creationId xmlns:p14="http://schemas.microsoft.com/office/powerpoint/2010/main" val="800415898"/>
+        <p14:creationId xmlns:p14="http://schemas.microsoft.com/office/powerpoint/2010/main" val="1662872657"/>
       </p:ext>
     </p:extLst>
   </p:cSld>
@@ -4447,6 +4671,71 @@
         </p:blipFill>
         <p:spPr>
           <a:xfrm>
+            <a:off x="21199" y="910976"/>
+            <a:ext cx="9122801" cy="4426447"/>
+          </a:xfrm>
+          <a:prstGeom prst="rect">
+            <a:avLst/>
+          </a:prstGeom>
+        </p:spPr>
+      </p:pic>
+    </p:spTree>
+    <p:extLst>
+      <p:ext uri="{BB962C8B-B14F-4D97-AF65-F5344CB8AC3E}">
+        <p14:creationId xmlns:p14="http://schemas.microsoft.com/office/powerpoint/2010/main" val="800415898"/>
+      </p:ext>
+    </p:extLst>
+  </p:cSld>
+  <p:clrMapOvr>
+    <a:masterClrMapping/>
+  </p:clrMapOvr>
+</p:sld>
+</file>
+
+<file path=ppt/slides/slide16.xml><?xml version="1.0" encoding="utf-8"?>
+<p:sld xmlns:a="http://schemas.openxmlformats.org/drawingml/2006/main" xmlns:r="http://schemas.openxmlformats.org/officeDocument/2006/relationships" xmlns:p="http://schemas.openxmlformats.org/presentationml/2006/main">
+  <p:cSld>
+    <p:spTree>
+      <p:nvGrpSpPr>
+        <p:cNvPr id="1" name=""/>
+        <p:cNvGrpSpPr/>
+        <p:nvPr/>
+      </p:nvGrpSpPr>
+      <p:grpSpPr>
+        <a:xfrm>
+          <a:off x="0" y="0"/>
+          <a:ext cx="0" cy="0"/>
+          <a:chOff x="0" y="0"/>
+          <a:chExt cx="0" cy="0"/>
+        </a:xfrm>
+      </p:grpSpPr>
+      <p:pic>
+        <p:nvPicPr>
+          <p:cNvPr id="3" name="Picture 2">
+            <a:extLst>
+              <a:ext uri="{FF2B5EF4-FFF2-40B4-BE49-F238E27FC236}">
+                <a16:creationId xmlns:a16="http://schemas.microsoft.com/office/drawing/2014/main" id="{5D8AE060-5083-47C9-B225-18F877328F7E}"/>
+              </a:ext>
+            </a:extLst>
+          </p:cNvPr>
+          <p:cNvPicPr>
+            <a:picLocks noChangeAspect="1"/>
+          </p:cNvPicPr>
+          <p:nvPr/>
+        </p:nvPicPr>
+        <p:blipFill>
+          <a:blip r:embed="rId2">
+            <a:extLst>
+              <a:ext uri="{28A0092B-C50C-407E-A947-70E740481C1C}">
+                <a14:useLocalDpi xmlns:a14="http://schemas.microsoft.com/office/drawing/2010/main" val="0"/>
+              </a:ext>
+            </a:extLst>
+          </a:blip>
+          <a:srcRect/>
+          <a:stretch/>
+        </p:blipFill>
+        <p:spPr>
+          <a:xfrm>
             <a:off x="285893" y="910976"/>
             <a:ext cx="8593413" cy="4426447"/>
           </a:xfrm>
@@ -4468,7 +4757,7 @@
 </p:sld>
 </file>
 
-<file path=ppt/slides/slide16.xml><?xml version="1.0" encoding="utf-8"?>
+<file path=ppt/slides/slide17.xml><?xml version="1.0" encoding="utf-8"?>
 <p:sld xmlns:a="http://schemas.openxmlformats.org/drawingml/2006/main" xmlns:r="http://schemas.openxmlformats.org/officeDocument/2006/relationships" xmlns:p="http://schemas.openxmlformats.org/presentationml/2006/main">
   <p:cSld>
     <p:spTree>
@@ -4534,6 +4823,2466 @@
 </file>
 
 <file path=ppt/slides/slide2.xml><?xml version="1.0" encoding="utf-8"?>
+<p:sld xmlns:a="http://schemas.openxmlformats.org/drawingml/2006/main" xmlns:r="http://schemas.openxmlformats.org/officeDocument/2006/relationships" xmlns:p="http://schemas.openxmlformats.org/presentationml/2006/main">
+  <p:cSld>
+    <p:spTree>
+      <p:nvGrpSpPr>
+        <p:cNvPr id="1" name=""/>
+        <p:cNvGrpSpPr/>
+        <p:nvPr/>
+      </p:nvGrpSpPr>
+      <p:grpSpPr>
+        <a:xfrm>
+          <a:off x="0" y="0"/>
+          <a:ext cx="0" cy="0"/>
+          <a:chOff x="0" y="0"/>
+          <a:chExt cx="0" cy="0"/>
+        </a:xfrm>
+      </p:grpSpPr>
+      <p:sp>
+        <p:nvSpPr>
+          <p:cNvPr id="13" name="Rectangle: Rounded Corners 12">
+            <a:extLst>
+              <a:ext uri="{FF2B5EF4-FFF2-40B4-BE49-F238E27FC236}">
+                <a16:creationId xmlns:a16="http://schemas.microsoft.com/office/drawing/2014/main" id="{D2B81CFA-A3CF-41B5-8AD8-FF342FED225D}"/>
+              </a:ext>
+            </a:extLst>
+          </p:cNvPr>
+          <p:cNvSpPr/>
+          <p:nvPr/>
+        </p:nvSpPr>
+        <p:spPr>
+          <a:xfrm>
+            <a:off x="27670" y="1359074"/>
+            <a:ext cx="2452181" cy="1641705"/>
+          </a:xfrm>
+          <a:prstGeom prst="roundRect">
+            <a:avLst/>
+          </a:prstGeom>
+          <a:solidFill>
+            <a:schemeClr val="bg1"/>
+          </a:solidFill>
+        </p:spPr>
+        <p:style>
+          <a:lnRef idx="2">
+            <a:schemeClr val="accent1">
+              <a:shade val="50000"/>
+            </a:schemeClr>
+          </a:lnRef>
+          <a:fillRef idx="1">
+            <a:schemeClr val="accent1"/>
+          </a:fillRef>
+          <a:effectRef idx="0">
+            <a:schemeClr val="accent1"/>
+          </a:effectRef>
+          <a:fontRef idx="minor">
+            <a:schemeClr val="lt1"/>
+          </a:fontRef>
+        </p:style>
+        <p:txBody>
+          <a:bodyPr rtlCol="0" anchor="ctr"/>
+          <a:lstStyle/>
+          <a:p>
+            <a:pPr algn="ctr"/>
+            <a:endParaRPr lang="en-US" sz="1350" dirty="0"/>
+          </a:p>
+        </p:txBody>
+      </p:sp>
+      <p:sp>
+        <p:nvSpPr>
+          <p:cNvPr id="16" name="Arrow: Down 15">
+            <a:extLst>
+              <a:ext uri="{FF2B5EF4-FFF2-40B4-BE49-F238E27FC236}">
+                <a16:creationId xmlns:a16="http://schemas.microsoft.com/office/drawing/2014/main" id="{52DEDD09-BCE1-4926-AEBE-5689FA4C154D}"/>
+              </a:ext>
+            </a:extLst>
+          </p:cNvPr>
+          <p:cNvSpPr/>
+          <p:nvPr/>
+        </p:nvSpPr>
+        <p:spPr>
+          <a:xfrm rot="19752251">
+            <a:off x="2451936" y="3007727"/>
+            <a:ext cx="413412" cy="789764"/>
+          </a:xfrm>
+          <a:prstGeom prst="downArrow">
+            <a:avLst/>
+          </a:prstGeom>
+        </p:spPr>
+        <p:style>
+          <a:lnRef idx="2">
+            <a:schemeClr val="accent1">
+              <a:shade val="50000"/>
+            </a:schemeClr>
+          </a:lnRef>
+          <a:fillRef idx="1">
+            <a:schemeClr val="accent1"/>
+          </a:fillRef>
+          <a:effectRef idx="0">
+            <a:schemeClr val="accent1"/>
+          </a:effectRef>
+          <a:fontRef idx="minor">
+            <a:schemeClr val="lt1"/>
+          </a:fontRef>
+        </p:style>
+        <p:txBody>
+          <a:bodyPr rtlCol="0" anchor="ctr"/>
+          <a:lstStyle/>
+          <a:p>
+            <a:pPr algn="ctr"/>
+            <a:endParaRPr lang="en-US" sz="1350" dirty="0"/>
+          </a:p>
+        </p:txBody>
+      </p:sp>
+      <p:cxnSp>
+        <p:nvCxnSpPr>
+          <p:cNvPr id="25" name="Straight Connector 24">
+            <a:extLst>
+              <a:ext uri="{FF2B5EF4-FFF2-40B4-BE49-F238E27FC236}">
+                <a16:creationId xmlns:a16="http://schemas.microsoft.com/office/drawing/2014/main" id="{6C5128B8-2606-4B92-A1D0-F3F6CA627C9F}"/>
+              </a:ext>
+            </a:extLst>
+          </p:cNvPr>
+          <p:cNvCxnSpPr>
+            <a:cxnSpLocks/>
+          </p:cNvCxnSpPr>
+          <p:nvPr/>
+        </p:nvCxnSpPr>
+        <p:spPr>
+          <a:xfrm>
+            <a:off x="4577962" y="857250"/>
+            <a:ext cx="0" cy="5143500"/>
+          </a:xfrm>
+          <a:prstGeom prst="line">
+            <a:avLst/>
+          </a:prstGeom>
+        </p:spPr>
+        <p:style>
+          <a:lnRef idx="1">
+            <a:schemeClr val="dk1"/>
+          </a:lnRef>
+          <a:fillRef idx="0">
+            <a:schemeClr val="dk1"/>
+          </a:fillRef>
+          <a:effectRef idx="0">
+            <a:schemeClr val="dk1"/>
+          </a:effectRef>
+          <a:fontRef idx="minor">
+            <a:schemeClr val="tx1"/>
+          </a:fontRef>
+        </p:style>
+      </p:cxnSp>
+      <p:sp>
+        <p:nvSpPr>
+          <p:cNvPr id="27" name="Rectangle 26">
+            <a:extLst>
+              <a:ext uri="{FF2B5EF4-FFF2-40B4-BE49-F238E27FC236}">
+                <a16:creationId xmlns:a16="http://schemas.microsoft.com/office/drawing/2014/main" id="{73178D52-A05D-4E59-B584-F77C3D59A9D6}"/>
+              </a:ext>
+            </a:extLst>
+          </p:cNvPr>
+          <p:cNvSpPr/>
+          <p:nvPr/>
+        </p:nvSpPr>
+        <p:spPr>
+          <a:xfrm>
+            <a:off x="2034568" y="852427"/>
+            <a:ext cx="958529" cy="230834"/>
+          </a:xfrm>
+          <a:prstGeom prst="rect">
+            <a:avLst/>
+          </a:prstGeom>
+        </p:spPr>
+        <p:style>
+          <a:lnRef idx="2">
+            <a:schemeClr val="accent1">
+              <a:shade val="50000"/>
+            </a:schemeClr>
+          </a:lnRef>
+          <a:fillRef idx="1">
+            <a:schemeClr val="accent1"/>
+          </a:fillRef>
+          <a:effectRef idx="0">
+            <a:schemeClr val="accent1"/>
+          </a:effectRef>
+          <a:fontRef idx="minor">
+            <a:schemeClr val="lt1"/>
+          </a:fontRef>
+        </p:style>
+        <p:txBody>
+          <a:bodyPr rtlCol="0" anchor="ctr"/>
+          <a:lstStyle/>
+          <a:p>
+            <a:pPr algn="ctr"/>
+            <a:r>
+              <a:rPr lang="en-US" sz="1200" dirty="0"/>
+              <a:t>Pure Block</a:t>
+            </a:r>
+          </a:p>
+        </p:txBody>
+      </p:sp>
+      <p:sp>
+        <p:nvSpPr>
+          <p:cNvPr id="28" name="Rectangle 27">
+            <a:extLst>
+              <a:ext uri="{FF2B5EF4-FFF2-40B4-BE49-F238E27FC236}">
+                <a16:creationId xmlns:a16="http://schemas.microsoft.com/office/drawing/2014/main" id="{1E151D07-B147-485A-A8C4-CF2EDCEE522F}"/>
+              </a:ext>
+            </a:extLst>
+          </p:cNvPr>
+          <p:cNvSpPr/>
+          <p:nvPr/>
+        </p:nvSpPr>
+        <p:spPr>
+          <a:xfrm>
+            <a:off x="6405935" y="855619"/>
+            <a:ext cx="960120" cy="233172"/>
+          </a:xfrm>
+          <a:prstGeom prst="rect">
+            <a:avLst/>
+          </a:prstGeom>
+        </p:spPr>
+        <p:style>
+          <a:lnRef idx="2">
+            <a:schemeClr val="accent1">
+              <a:shade val="50000"/>
+            </a:schemeClr>
+          </a:lnRef>
+          <a:fillRef idx="1">
+            <a:schemeClr val="accent1"/>
+          </a:fillRef>
+          <a:effectRef idx="0">
+            <a:schemeClr val="accent1"/>
+          </a:effectRef>
+          <a:fontRef idx="minor">
+            <a:schemeClr val="lt1"/>
+          </a:fontRef>
+        </p:style>
+        <p:txBody>
+          <a:bodyPr rtlCol="0" anchor="ctr"/>
+          <a:lstStyle/>
+          <a:p>
+            <a:pPr algn="ctr"/>
+            <a:r>
+              <a:rPr lang="en-US" sz="1200" dirty="0"/>
+              <a:t>Switch Block</a:t>
+            </a:r>
+          </a:p>
+        </p:txBody>
+      </p:sp>
+      <p:sp>
+        <p:nvSpPr>
+          <p:cNvPr id="56" name="TextBox 55">
+            <a:extLst>
+              <a:ext uri="{FF2B5EF4-FFF2-40B4-BE49-F238E27FC236}">
+                <a16:creationId xmlns:a16="http://schemas.microsoft.com/office/drawing/2014/main" id="{9C102017-3FDF-47D8-95CF-D9CFAB0C63C2}"/>
+              </a:ext>
+            </a:extLst>
+          </p:cNvPr>
+          <p:cNvSpPr txBox="1"/>
+          <p:nvPr/>
+        </p:nvSpPr>
+        <p:spPr>
+          <a:xfrm>
+            <a:off x="256911" y="2018900"/>
+            <a:ext cx="1984786" cy="300082"/>
+          </a:xfrm>
+          <a:prstGeom prst="rect">
+            <a:avLst/>
+          </a:prstGeom>
+          <a:noFill/>
+        </p:spPr>
+        <p:txBody>
+          <a:bodyPr wrap="square" rtlCol="0">
+            <a:spAutoFit/>
+          </a:bodyPr>
+          <a:lstStyle/>
+          <a:p>
+            <a:pPr algn="ctr"/>
+            <a:r>
+              <a:rPr lang="en-US" sz="1350" b="1" dirty="0"/>
+              <a:t>B 18</a:t>
+            </a:r>
+          </a:p>
+        </p:txBody>
+      </p:sp>
+      <p:sp>
+        <p:nvSpPr>
+          <p:cNvPr id="57" name="TextBox 56">
+            <a:extLst>
+              <a:ext uri="{FF2B5EF4-FFF2-40B4-BE49-F238E27FC236}">
+                <a16:creationId xmlns:a16="http://schemas.microsoft.com/office/drawing/2014/main" id="{B325A3FA-63E5-4281-AE1F-95793E2D6660}"/>
+              </a:ext>
+            </a:extLst>
+          </p:cNvPr>
+          <p:cNvSpPr txBox="1"/>
+          <p:nvPr/>
+        </p:nvSpPr>
+        <p:spPr>
+          <a:xfrm>
+            <a:off x="-523690" y="1416353"/>
+            <a:ext cx="1984786" cy="415498"/>
+          </a:xfrm>
+          <a:prstGeom prst="rect">
+            <a:avLst/>
+          </a:prstGeom>
+          <a:noFill/>
+        </p:spPr>
+        <p:txBody>
+          <a:bodyPr wrap="square" rtlCol="0">
+            <a:spAutoFit/>
+          </a:bodyPr>
+          <a:lstStyle/>
+          <a:p>
+            <a:pPr algn="ctr"/>
+            <a:r>
+              <a:rPr lang="en-US" sz="1050" b="1" dirty="0"/>
+              <a:t>Q</a:t>
+            </a:r>
+          </a:p>
+          <a:p>
+            <a:pPr algn="ctr"/>
+            <a:r>
+              <a:rPr lang="en-US" sz="1050" b="1" dirty="0"/>
+              <a:t>Consonant</a:t>
+            </a:r>
+          </a:p>
+        </p:txBody>
+      </p:sp>
+      <p:sp>
+        <p:nvSpPr>
+          <p:cNvPr id="58" name="TextBox 57">
+            <a:extLst>
+              <a:ext uri="{FF2B5EF4-FFF2-40B4-BE49-F238E27FC236}">
+                <a16:creationId xmlns:a16="http://schemas.microsoft.com/office/drawing/2014/main" id="{D6E3A672-27CC-40A0-8407-4BBB76F71550}"/>
+              </a:ext>
+            </a:extLst>
+          </p:cNvPr>
+          <p:cNvSpPr txBox="1"/>
+          <p:nvPr/>
+        </p:nvSpPr>
+        <p:spPr>
+          <a:xfrm>
+            <a:off x="1137932" y="1431546"/>
+            <a:ext cx="1984786" cy="415498"/>
+          </a:xfrm>
+          <a:prstGeom prst="rect">
+            <a:avLst/>
+          </a:prstGeom>
+          <a:noFill/>
+        </p:spPr>
+        <p:txBody>
+          <a:bodyPr wrap="square" rtlCol="0">
+            <a:spAutoFit/>
+          </a:bodyPr>
+          <a:lstStyle/>
+          <a:p>
+            <a:pPr algn="ctr"/>
+            <a:r>
+              <a:rPr lang="en-US" sz="1050" b="1" dirty="0"/>
+              <a:t>P</a:t>
+            </a:r>
+          </a:p>
+          <a:p>
+            <a:pPr algn="ctr"/>
+            <a:r>
+              <a:rPr lang="en-US" sz="1050" b="1" dirty="0"/>
+              <a:t>Vowel</a:t>
+            </a:r>
+          </a:p>
+        </p:txBody>
+      </p:sp>
+      <p:sp>
+        <p:nvSpPr>
+          <p:cNvPr id="59" name="TextBox 58">
+            <a:extLst>
+              <a:ext uri="{FF2B5EF4-FFF2-40B4-BE49-F238E27FC236}">
+                <a16:creationId xmlns:a16="http://schemas.microsoft.com/office/drawing/2014/main" id="{D3EAC1E6-ECFE-4DF1-B1FD-5D64BF590034}"/>
+              </a:ext>
+            </a:extLst>
+          </p:cNvPr>
+          <p:cNvSpPr txBox="1"/>
+          <p:nvPr/>
+        </p:nvSpPr>
+        <p:spPr>
+          <a:xfrm>
+            <a:off x="904632" y="1176050"/>
+            <a:ext cx="958528" cy="253916"/>
+          </a:xfrm>
+          <a:prstGeom prst="rect">
+            <a:avLst/>
+          </a:prstGeom>
+          <a:noFill/>
+        </p:spPr>
+        <p:txBody>
+          <a:bodyPr wrap="square" rtlCol="0">
+            <a:spAutoFit/>
+          </a:bodyPr>
+          <a:lstStyle/>
+          <a:p>
+            <a:r>
+              <a:rPr lang="en-US" sz="1050" dirty="0"/>
+              <a:t>1</a:t>
+            </a:r>
+            <a:r>
+              <a:rPr lang="en-US" sz="1050" baseline="30000" dirty="0"/>
+              <a:t>st</a:t>
+            </a:r>
+            <a:r>
+              <a:rPr lang="en-US" sz="1050" dirty="0"/>
+              <a:t> Stimulus</a:t>
+            </a:r>
+          </a:p>
+        </p:txBody>
+      </p:sp>
+      <p:sp>
+        <p:nvSpPr>
+          <p:cNvPr id="60" name="TextBox 59">
+            <a:extLst>
+              <a:ext uri="{FF2B5EF4-FFF2-40B4-BE49-F238E27FC236}">
+                <a16:creationId xmlns:a16="http://schemas.microsoft.com/office/drawing/2014/main" id="{3F3DD859-1FEF-40A5-9688-A9E315CC74CB}"/>
+              </a:ext>
+            </a:extLst>
+          </p:cNvPr>
+          <p:cNvSpPr txBox="1"/>
+          <p:nvPr/>
+        </p:nvSpPr>
+        <p:spPr>
+          <a:xfrm>
+            <a:off x="147409" y="2980079"/>
+            <a:ext cx="2206145" cy="253916"/>
+          </a:xfrm>
+          <a:prstGeom prst="rect">
+            <a:avLst/>
+          </a:prstGeom>
+          <a:noFill/>
+        </p:spPr>
+        <p:txBody>
+          <a:bodyPr wrap="square" rtlCol="0">
+            <a:spAutoFit/>
+          </a:bodyPr>
+          <a:lstStyle/>
+          <a:p>
+            <a:r>
+              <a:rPr lang="en-US" sz="1050" b="1" dirty="0"/>
+              <a:t>B = consonant, </a:t>
+            </a:r>
+            <a:r>
+              <a:rPr lang="en-US" sz="1050" b="1" dirty="0">
+                <a:solidFill>
+                  <a:schemeClr val="accent1"/>
+                </a:solidFill>
+              </a:rPr>
+              <a:t>q = correct key press</a:t>
+            </a:r>
+          </a:p>
+        </p:txBody>
+      </p:sp>
+      <p:sp>
+        <p:nvSpPr>
+          <p:cNvPr id="61" name="TextBox 60">
+            <a:extLst>
+              <a:ext uri="{FF2B5EF4-FFF2-40B4-BE49-F238E27FC236}">
+                <a16:creationId xmlns:a16="http://schemas.microsoft.com/office/drawing/2014/main" id="{142F2BA2-79D0-4D53-8D3F-CB728E54B5A6}"/>
+              </a:ext>
+            </a:extLst>
+          </p:cNvPr>
+          <p:cNvSpPr txBox="1"/>
+          <p:nvPr/>
+        </p:nvSpPr>
+        <p:spPr>
+          <a:xfrm>
+            <a:off x="2709038" y="866117"/>
+            <a:ext cx="1984786" cy="230832"/>
+          </a:xfrm>
+          <a:prstGeom prst="rect">
+            <a:avLst/>
+          </a:prstGeom>
+          <a:noFill/>
+        </p:spPr>
+        <p:txBody>
+          <a:bodyPr wrap="square" rtlCol="0">
+            <a:spAutoFit/>
+          </a:bodyPr>
+          <a:lstStyle/>
+          <a:p>
+            <a:pPr algn="ctr"/>
+            <a:r>
+              <a:rPr lang="en-US" sz="900" dirty="0"/>
+              <a:t>(CV -&gt; CV / Letter -&gt; Letter)</a:t>
+            </a:r>
+          </a:p>
+        </p:txBody>
+      </p:sp>
+      <p:sp>
+        <p:nvSpPr>
+          <p:cNvPr id="68" name="TextBox 67">
+            <a:extLst>
+              <a:ext uri="{FF2B5EF4-FFF2-40B4-BE49-F238E27FC236}">
+                <a16:creationId xmlns:a16="http://schemas.microsoft.com/office/drawing/2014/main" id="{15139104-B663-4B27-BEA3-628E768FC8E9}"/>
+              </a:ext>
+            </a:extLst>
+          </p:cNvPr>
+          <p:cNvSpPr txBox="1"/>
+          <p:nvPr/>
+        </p:nvSpPr>
+        <p:spPr>
+          <a:xfrm>
+            <a:off x="5483670" y="1160783"/>
+            <a:ext cx="958528" cy="253916"/>
+          </a:xfrm>
+          <a:prstGeom prst="rect">
+            <a:avLst/>
+          </a:prstGeom>
+          <a:noFill/>
+        </p:spPr>
+        <p:txBody>
+          <a:bodyPr wrap="square" rtlCol="0">
+            <a:spAutoFit/>
+          </a:bodyPr>
+          <a:lstStyle/>
+          <a:p>
+            <a:r>
+              <a:rPr lang="en-US" sz="1050" dirty="0"/>
+              <a:t>1</a:t>
+            </a:r>
+            <a:r>
+              <a:rPr lang="en-US" sz="1050" baseline="30000" dirty="0"/>
+              <a:t>st</a:t>
+            </a:r>
+            <a:r>
+              <a:rPr lang="en-US" sz="1050" dirty="0"/>
+              <a:t> Stimulus</a:t>
+            </a:r>
+          </a:p>
+        </p:txBody>
+      </p:sp>
+      <p:sp>
+        <p:nvSpPr>
+          <p:cNvPr id="70" name="Rectangle: Rounded Corners 69">
+            <a:extLst>
+              <a:ext uri="{FF2B5EF4-FFF2-40B4-BE49-F238E27FC236}">
+                <a16:creationId xmlns:a16="http://schemas.microsoft.com/office/drawing/2014/main" id="{44F7BFF9-36A3-4E0B-912A-C717466402AF}"/>
+              </a:ext>
+            </a:extLst>
+          </p:cNvPr>
+          <p:cNvSpPr/>
+          <p:nvPr/>
+        </p:nvSpPr>
+        <p:spPr>
+          <a:xfrm>
+            <a:off x="4593030" y="1350416"/>
+            <a:ext cx="2455164" cy="1639062"/>
+          </a:xfrm>
+          <a:prstGeom prst="roundRect">
+            <a:avLst/>
+          </a:prstGeom>
+          <a:solidFill>
+            <a:schemeClr val="bg1"/>
+          </a:solidFill>
+        </p:spPr>
+        <p:style>
+          <a:lnRef idx="2">
+            <a:schemeClr val="accent1">
+              <a:shade val="50000"/>
+            </a:schemeClr>
+          </a:lnRef>
+          <a:fillRef idx="1">
+            <a:schemeClr val="accent1"/>
+          </a:fillRef>
+          <a:effectRef idx="0">
+            <a:schemeClr val="accent1"/>
+          </a:effectRef>
+          <a:fontRef idx="minor">
+            <a:schemeClr val="lt1"/>
+          </a:fontRef>
+        </p:style>
+        <p:txBody>
+          <a:bodyPr rtlCol="0" anchor="ctr"/>
+          <a:lstStyle/>
+          <a:p>
+            <a:pPr algn="ctr"/>
+            <a:endParaRPr lang="en-US" sz="1350"/>
+          </a:p>
+        </p:txBody>
+      </p:sp>
+      <p:sp>
+        <p:nvSpPr>
+          <p:cNvPr id="71" name="TextBox 70">
+            <a:extLst>
+              <a:ext uri="{FF2B5EF4-FFF2-40B4-BE49-F238E27FC236}">
+                <a16:creationId xmlns:a16="http://schemas.microsoft.com/office/drawing/2014/main" id="{921D7E0B-84ED-4C38-A41E-A0CEBB989D8F}"/>
+              </a:ext>
+            </a:extLst>
+          </p:cNvPr>
+          <p:cNvSpPr txBox="1"/>
+          <p:nvPr/>
+        </p:nvSpPr>
+        <p:spPr>
+          <a:xfrm>
+            <a:off x="4875192" y="2074925"/>
+            <a:ext cx="1984786" cy="300082"/>
+          </a:xfrm>
+          <a:prstGeom prst="rect">
+            <a:avLst/>
+          </a:prstGeom>
+          <a:noFill/>
+        </p:spPr>
+        <p:txBody>
+          <a:bodyPr wrap="square" rtlCol="0">
+            <a:spAutoFit/>
+          </a:bodyPr>
+          <a:lstStyle/>
+          <a:p>
+            <a:pPr algn="ctr"/>
+            <a:r>
+              <a:rPr lang="en-US" sz="1350" b="1" dirty="0"/>
+              <a:t>D 37</a:t>
+            </a:r>
+          </a:p>
+        </p:txBody>
+      </p:sp>
+      <p:sp>
+        <p:nvSpPr>
+          <p:cNvPr id="72" name="TextBox 71">
+            <a:extLst>
+              <a:ext uri="{FF2B5EF4-FFF2-40B4-BE49-F238E27FC236}">
+                <a16:creationId xmlns:a16="http://schemas.microsoft.com/office/drawing/2014/main" id="{B612B601-B6C0-452D-B038-0B6BF4A51DE9}"/>
+              </a:ext>
+            </a:extLst>
+          </p:cNvPr>
+          <p:cNvSpPr txBox="1"/>
+          <p:nvPr/>
+        </p:nvSpPr>
+        <p:spPr>
+          <a:xfrm>
+            <a:off x="3983811" y="1391616"/>
+            <a:ext cx="1984786" cy="577081"/>
+          </a:xfrm>
+          <a:prstGeom prst="rect">
+            <a:avLst/>
+          </a:prstGeom>
+          <a:noFill/>
+        </p:spPr>
+        <p:txBody>
+          <a:bodyPr wrap="square" rtlCol="0">
+            <a:spAutoFit/>
+          </a:bodyPr>
+          <a:lstStyle/>
+          <a:p>
+            <a:pPr algn="ctr"/>
+            <a:r>
+              <a:rPr lang="en-US" sz="1050" b="1" dirty="0"/>
+              <a:t>Q</a:t>
+            </a:r>
+          </a:p>
+          <a:p>
+            <a:pPr algn="ctr"/>
+            <a:r>
+              <a:rPr lang="en-US" sz="1050" b="1" dirty="0"/>
+              <a:t>Consonant</a:t>
+            </a:r>
+          </a:p>
+          <a:p>
+            <a:pPr algn="ctr"/>
+            <a:r>
+              <a:rPr lang="en-US" sz="1050" b="1" dirty="0"/>
+              <a:t>Odd</a:t>
+            </a:r>
+          </a:p>
+        </p:txBody>
+      </p:sp>
+      <p:sp>
+        <p:nvSpPr>
+          <p:cNvPr id="73" name="TextBox 72">
+            <a:extLst>
+              <a:ext uri="{FF2B5EF4-FFF2-40B4-BE49-F238E27FC236}">
+                <a16:creationId xmlns:a16="http://schemas.microsoft.com/office/drawing/2014/main" id="{CC6EC0C8-8BB8-47A3-B31C-726B1BC45FDD}"/>
+              </a:ext>
+            </a:extLst>
+          </p:cNvPr>
+          <p:cNvSpPr txBox="1"/>
+          <p:nvPr/>
+        </p:nvSpPr>
+        <p:spPr>
+          <a:xfrm>
+            <a:off x="5770236" y="1384394"/>
+            <a:ext cx="1984786" cy="577081"/>
+          </a:xfrm>
+          <a:prstGeom prst="rect">
+            <a:avLst/>
+          </a:prstGeom>
+          <a:noFill/>
+        </p:spPr>
+        <p:txBody>
+          <a:bodyPr wrap="square" rtlCol="0">
+            <a:spAutoFit/>
+          </a:bodyPr>
+          <a:lstStyle/>
+          <a:p>
+            <a:pPr algn="ctr"/>
+            <a:r>
+              <a:rPr lang="en-US" sz="1050" b="1" dirty="0"/>
+              <a:t>P</a:t>
+            </a:r>
+          </a:p>
+          <a:p>
+            <a:pPr algn="ctr"/>
+            <a:r>
+              <a:rPr lang="en-US" sz="1050" b="1" dirty="0"/>
+              <a:t>Vowel</a:t>
+            </a:r>
+          </a:p>
+          <a:p>
+            <a:pPr algn="ctr"/>
+            <a:r>
+              <a:rPr lang="en-US" sz="1050" b="1" dirty="0"/>
+              <a:t>Even</a:t>
+            </a:r>
+          </a:p>
+        </p:txBody>
+      </p:sp>
+      <p:sp>
+        <p:nvSpPr>
+          <p:cNvPr id="75" name="TextBox 74">
+            <a:extLst>
+              <a:ext uri="{FF2B5EF4-FFF2-40B4-BE49-F238E27FC236}">
+                <a16:creationId xmlns:a16="http://schemas.microsoft.com/office/drawing/2014/main" id="{D4502F45-F70C-4538-9E8A-C8BE05A441DF}"/>
+              </a:ext>
+            </a:extLst>
+          </p:cNvPr>
+          <p:cNvSpPr txBox="1"/>
+          <p:nvPr/>
+        </p:nvSpPr>
+        <p:spPr>
+          <a:xfrm>
+            <a:off x="4708083" y="2973100"/>
+            <a:ext cx="2206145" cy="253916"/>
+          </a:xfrm>
+          <a:prstGeom prst="rect">
+            <a:avLst/>
+          </a:prstGeom>
+          <a:noFill/>
+        </p:spPr>
+        <p:txBody>
+          <a:bodyPr wrap="square" rtlCol="0">
+            <a:spAutoFit/>
+          </a:bodyPr>
+          <a:lstStyle/>
+          <a:p>
+            <a:r>
+              <a:rPr lang="en-US" sz="1050" b="1" dirty="0"/>
+              <a:t>D = consonant, </a:t>
+            </a:r>
+            <a:r>
+              <a:rPr lang="en-US" sz="1050" b="1" dirty="0">
+                <a:solidFill>
+                  <a:schemeClr val="accent1"/>
+                </a:solidFill>
+              </a:rPr>
+              <a:t>q = correct key press</a:t>
+            </a:r>
+          </a:p>
+        </p:txBody>
+      </p:sp>
+      <p:sp>
+        <p:nvSpPr>
+          <p:cNvPr id="76" name="Rectangle: Rounded Corners 75">
+            <a:extLst>
+              <a:ext uri="{FF2B5EF4-FFF2-40B4-BE49-F238E27FC236}">
+                <a16:creationId xmlns:a16="http://schemas.microsoft.com/office/drawing/2014/main" id="{956EBD43-8867-4C71-98A3-F7CF186FB5DB}"/>
+              </a:ext>
+            </a:extLst>
+          </p:cNvPr>
+          <p:cNvSpPr/>
+          <p:nvPr/>
+        </p:nvSpPr>
+        <p:spPr>
+          <a:xfrm>
+            <a:off x="2056432" y="4049182"/>
+            <a:ext cx="2455164" cy="1639062"/>
+          </a:xfrm>
+          <a:prstGeom prst="roundRect">
+            <a:avLst/>
+          </a:prstGeom>
+          <a:solidFill>
+            <a:schemeClr val="bg1"/>
+          </a:solidFill>
+        </p:spPr>
+        <p:style>
+          <a:lnRef idx="2">
+            <a:schemeClr val="accent1">
+              <a:shade val="50000"/>
+            </a:schemeClr>
+          </a:lnRef>
+          <a:fillRef idx="1">
+            <a:schemeClr val="accent1"/>
+          </a:fillRef>
+          <a:effectRef idx="0">
+            <a:schemeClr val="accent1"/>
+          </a:effectRef>
+          <a:fontRef idx="minor">
+            <a:schemeClr val="lt1"/>
+          </a:fontRef>
+        </p:style>
+        <p:txBody>
+          <a:bodyPr rtlCol="0" anchor="ctr"/>
+          <a:lstStyle/>
+          <a:p>
+            <a:pPr algn="ctr"/>
+            <a:endParaRPr lang="en-US" sz="1350"/>
+          </a:p>
+        </p:txBody>
+      </p:sp>
+      <p:sp>
+        <p:nvSpPr>
+          <p:cNvPr id="77" name="TextBox 76">
+            <a:extLst>
+              <a:ext uri="{FF2B5EF4-FFF2-40B4-BE49-F238E27FC236}">
+                <a16:creationId xmlns:a16="http://schemas.microsoft.com/office/drawing/2014/main" id="{E23F85B7-113D-4905-B83C-8B145D8915F7}"/>
+              </a:ext>
+            </a:extLst>
+          </p:cNvPr>
+          <p:cNvSpPr txBox="1"/>
+          <p:nvPr/>
+        </p:nvSpPr>
+        <p:spPr>
+          <a:xfrm>
+            <a:off x="2323175" y="4737719"/>
+            <a:ext cx="1984786" cy="300082"/>
+          </a:xfrm>
+          <a:prstGeom prst="rect">
+            <a:avLst/>
+          </a:prstGeom>
+          <a:noFill/>
+        </p:spPr>
+        <p:txBody>
+          <a:bodyPr wrap="square" rtlCol="0">
+            <a:spAutoFit/>
+          </a:bodyPr>
+          <a:lstStyle/>
+          <a:p>
+            <a:pPr algn="ctr"/>
+            <a:r>
+              <a:rPr lang="en-US" sz="1350" b="1" dirty="0"/>
+              <a:t>A 20</a:t>
+            </a:r>
+          </a:p>
+        </p:txBody>
+      </p:sp>
+      <p:sp>
+        <p:nvSpPr>
+          <p:cNvPr id="78" name="TextBox 77">
+            <a:extLst>
+              <a:ext uri="{FF2B5EF4-FFF2-40B4-BE49-F238E27FC236}">
+                <a16:creationId xmlns:a16="http://schemas.microsoft.com/office/drawing/2014/main" id="{F5B6FD9B-F0BF-429B-B153-B29CD28A2CDF}"/>
+              </a:ext>
+            </a:extLst>
+          </p:cNvPr>
+          <p:cNvSpPr txBox="1"/>
+          <p:nvPr/>
+        </p:nvSpPr>
+        <p:spPr>
+          <a:xfrm>
+            <a:off x="1482466" y="4126702"/>
+            <a:ext cx="1984786" cy="415498"/>
+          </a:xfrm>
+          <a:prstGeom prst="rect">
+            <a:avLst/>
+          </a:prstGeom>
+          <a:noFill/>
+        </p:spPr>
+        <p:txBody>
+          <a:bodyPr wrap="square" rtlCol="0">
+            <a:spAutoFit/>
+          </a:bodyPr>
+          <a:lstStyle/>
+          <a:p>
+            <a:pPr algn="ctr"/>
+            <a:r>
+              <a:rPr lang="en-US" sz="1050" b="1" dirty="0"/>
+              <a:t>Q</a:t>
+            </a:r>
+          </a:p>
+          <a:p>
+            <a:pPr algn="ctr"/>
+            <a:r>
+              <a:rPr lang="en-US" sz="1050" b="1" dirty="0"/>
+              <a:t>Consonant</a:t>
+            </a:r>
+          </a:p>
+        </p:txBody>
+      </p:sp>
+      <p:sp>
+        <p:nvSpPr>
+          <p:cNvPr id="79" name="TextBox 78">
+            <a:extLst>
+              <a:ext uri="{FF2B5EF4-FFF2-40B4-BE49-F238E27FC236}">
+                <a16:creationId xmlns:a16="http://schemas.microsoft.com/office/drawing/2014/main" id="{E264919F-4E06-4FE7-AF6E-68A68BE00BD0}"/>
+              </a:ext>
+            </a:extLst>
+          </p:cNvPr>
+          <p:cNvSpPr txBox="1"/>
+          <p:nvPr/>
+        </p:nvSpPr>
+        <p:spPr>
+          <a:xfrm>
+            <a:off x="3177033" y="4139603"/>
+            <a:ext cx="1984786" cy="415498"/>
+          </a:xfrm>
+          <a:prstGeom prst="rect">
+            <a:avLst/>
+          </a:prstGeom>
+          <a:noFill/>
+        </p:spPr>
+        <p:txBody>
+          <a:bodyPr wrap="square" rtlCol="0">
+            <a:spAutoFit/>
+          </a:bodyPr>
+          <a:lstStyle/>
+          <a:p>
+            <a:pPr algn="ctr"/>
+            <a:r>
+              <a:rPr lang="en-US" sz="1050" b="1" dirty="0"/>
+              <a:t>P</a:t>
+            </a:r>
+          </a:p>
+          <a:p>
+            <a:pPr algn="ctr"/>
+            <a:r>
+              <a:rPr lang="en-US" sz="1050" b="1" dirty="0"/>
+              <a:t>Vowel</a:t>
+            </a:r>
+          </a:p>
+        </p:txBody>
+      </p:sp>
+      <p:sp>
+        <p:nvSpPr>
+          <p:cNvPr id="80" name="TextBox 79">
+            <a:extLst>
+              <a:ext uri="{FF2B5EF4-FFF2-40B4-BE49-F238E27FC236}">
+                <a16:creationId xmlns:a16="http://schemas.microsoft.com/office/drawing/2014/main" id="{D75EBCA8-F026-4008-A90B-7E73D8E5584B}"/>
+              </a:ext>
+            </a:extLst>
+          </p:cNvPr>
+          <p:cNvSpPr txBox="1"/>
+          <p:nvPr/>
+        </p:nvSpPr>
+        <p:spPr>
+          <a:xfrm>
+            <a:off x="2895264" y="3854173"/>
+            <a:ext cx="958528" cy="253916"/>
+          </a:xfrm>
+          <a:prstGeom prst="rect">
+            <a:avLst/>
+          </a:prstGeom>
+          <a:noFill/>
+        </p:spPr>
+        <p:txBody>
+          <a:bodyPr wrap="square" rtlCol="0">
+            <a:spAutoFit/>
+          </a:bodyPr>
+          <a:lstStyle/>
+          <a:p>
+            <a:r>
+              <a:rPr lang="en-US" sz="1050" dirty="0"/>
+              <a:t>2</a:t>
+            </a:r>
+            <a:r>
+              <a:rPr lang="en-US" sz="1050" baseline="30000" dirty="0"/>
+              <a:t>nd</a:t>
+            </a:r>
+            <a:r>
+              <a:rPr lang="en-US" sz="1050" dirty="0"/>
+              <a:t> Stimulus</a:t>
+            </a:r>
+          </a:p>
+        </p:txBody>
+      </p:sp>
+      <p:sp>
+        <p:nvSpPr>
+          <p:cNvPr id="81" name="TextBox 80">
+            <a:extLst>
+              <a:ext uri="{FF2B5EF4-FFF2-40B4-BE49-F238E27FC236}">
+                <a16:creationId xmlns:a16="http://schemas.microsoft.com/office/drawing/2014/main" id="{7EB3C79D-D52E-4320-B605-CC015135DEF7}"/>
+              </a:ext>
+            </a:extLst>
+          </p:cNvPr>
+          <p:cNvSpPr txBox="1"/>
+          <p:nvPr/>
+        </p:nvSpPr>
+        <p:spPr>
+          <a:xfrm>
+            <a:off x="2203100" y="5678849"/>
+            <a:ext cx="2206145" cy="253916"/>
+          </a:xfrm>
+          <a:prstGeom prst="rect">
+            <a:avLst/>
+          </a:prstGeom>
+          <a:noFill/>
+        </p:spPr>
+        <p:txBody>
+          <a:bodyPr wrap="square" rtlCol="0">
+            <a:spAutoFit/>
+          </a:bodyPr>
+          <a:lstStyle/>
+          <a:p>
+            <a:r>
+              <a:rPr lang="en-US" sz="1050" b="1" dirty="0"/>
+              <a:t>A = Vowel, </a:t>
+            </a:r>
+            <a:r>
+              <a:rPr lang="en-US" sz="1050" b="1" dirty="0">
+                <a:solidFill>
+                  <a:schemeClr val="accent1"/>
+                </a:solidFill>
+              </a:rPr>
+              <a:t>p = correct key press</a:t>
+            </a:r>
+          </a:p>
+        </p:txBody>
+      </p:sp>
+      <p:sp>
+        <p:nvSpPr>
+          <p:cNvPr id="82" name="Rectangle: Rounded Corners 81">
+            <a:extLst>
+              <a:ext uri="{FF2B5EF4-FFF2-40B4-BE49-F238E27FC236}">
+                <a16:creationId xmlns:a16="http://schemas.microsoft.com/office/drawing/2014/main" id="{75F85112-31BE-4173-A5FE-B6E72DEEBE14}"/>
+              </a:ext>
+            </a:extLst>
+          </p:cNvPr>
+          <p:cNvSpPr/>
+          <p:nvPr/>
+        </p:nvSpPr>
+        <p:spPr>
+          <a:xfrm>
+            <a:off x="6597827" y="4076992"/>
+            <a:ext cx="2455164" cy="1639062"/>
+          </a:xfrm>
+          <a:prstGeom prst="roundRect">
+            <a:avLst/>
+          </a:prstGeom>
+          <a:solidFill>
+            <a:schemeClr val="bg1"/>
+          </a:solidFill>
+        </p:spPr>
+        <p:style>
+          <a:lnRef idx="2">
+            <a:schemeClr val="accent1">
+              <a:shade val="50000"/>
+            </a:schemeClr>
+          </a:lnRef>
+          <a:fillRef idx="1">
+            <a:schemeClr val="accent1"/>
+          </a:fillRef>
+          <a:effectRef idx="0">
+            <a:schemeClr val="accent1"/>
+          </a:effectRef>
+          <a:fontRef idx="minor">
+            <a:schemeClr val="lt1"/>
+          </a:fontRef>
+        </p:style>
+        <p:txBody>
+          <a:bodyPr rtlCol="0" anchor="ctr"/>
+          <a:lstStyle/>
+          <a:p>
+            <a:pPr algn="ctr"/>
+            <a:endParaRPr lang="en-US" sz="1350"/>
+          </a:p>
+        </p:txBody>
+      </p:sp>
+      <p:sp>
+        <p:nvSpPr>
+          <p:cNvPr id="83" name="TextBox 82">
+            <a:extLst>
+              <a:ext uri="{FF2B5EF4-FFF2-40B4-BE49-F238E27FC236}">
+                <a16:creationId xmlns:a16="http://schemas.microsoft.com/office/drawing/2014/main" id="{347C4736-7D9F-4B66-9BEF-0B722A2D6945}"/>
+              </a:ext>
+            </a:extLst>
+          </p:cNvPr>
+          <p:cNvSpPr txBox="1"/>
+          <p:nvPr/>
+        </p:nvSpPr>
+        <p:spPr>
+          <a:xfrm>
+            <a:off x="6831794" y="4829239"/>
+            <a:ext cx="1984786" cy="300082"/>
+          </a:xfrm>
+          <a:prstGeom prst="rect">
+            <a:avLst/>
+          </a:prstGeom>
+          <a:noFill/>
+        </p:spPr>
+        <p:txBody>
+          <a:bodyPr wrap="square" rtlCol="0">
+            <a:spAutoFit/>
+          </a:bodyPr>
+          <a:lstStyle/>
+          <a:p>
+            <a:pPr algn="ctr"/>
+            <a:r>
+              <a:rPr lang="en-US" sz="1350" b="1" dirty="0"/>
+              <a:t>O 13</a:t>
+            </a:r>
+          </a:p>
+        </p:txBody>
+      </p:sp>
+      <p:sp>
+        <p:nvSpPr>
+          <p:cNvPr id="84" name="TextBox 83">
+            <a:extLst>
+              <a:ext uri="{FF2B5EF4-FFF2-40B4-BE49-F238E27FC236}">
+                <a16:creationId xmlns:a16="http://schemas.microsoft.com/office/drawing/2014/main" id="{5DF659C9-4F36-427D-8AFC-78AB4C93FF2C}"/>
+              </a:ext>
+            </a:extLst>
+          </p:cNvPr>
+          <p:cNvSpPr txBox="1"/>
+          <p:nvPr/>
+        </p:nvSpPr>
+        <p:spPr>
+          <a:xfrm>
+            <a:off x="5947605" y="4122951"/>
+            <a:ext cx="1984786" cy="577081"/>
+          </a:xfrm>
+          <a:prstGeom prst="rect">
+            <a:avLst/>
+          </a:prstGeom>
+          <a:noFill/>
+        </p:spPr>
+        <p:txBody>
+          <a:bodyPr wrap="square" rtlCol="0">
+            <a:spAutoFit/>
+          </a:bodyPr>
+          <a:lstStyle/>
+          <a:p>
+            <a:pPr algn="ctr"/>
+            <a:r>
+              <a:rPr lang="en-US" sz="1050" b="1" dirty="0"/>
+              <a:t>Q</a:t>
+            </a:r>
+          </a:p>
+          <a:p>
+            <a:pPr algn="ctr"/>
+            <a:r>
+              <a:rPr lang="en-US" sz="1050" b="1" dirty="0"/>
+              <a:t>Consonant</a:t>
+            </a:r>
+          </a:p>
+          <a:p>
+            <a:pPr algn="ctr"/>
+            <a:r>
+              <a:rPr lang="en-US" sz="1050" b="1" dirty="0"/>
+              <a:t>Odd</a:t>
+            </a:r>
+          </a:p>
+        </p:txBody>
+      </p:sp>
+      <p:sp>
+        <p:nvSpPr>
+          <p:cNvPr id="85" name="TextBox 84">
+            <a:extLst>
+              <a:ext uri="{FF2B5EF4-FFF2-40B4-BE49-F238E27FC236}">
+                <a16:creationId xmlns:a16="http://schemas.microsoft.com/office/drawing/2014/main" id="{E4BE898B-FF94-4F34-9044-E7697848E7FD}"/>
+              </a:ext>
+            </a:extLst>
+          </p:cNvPr>
+          <p:cNvSpPr txBox="1"/>
+          <p:nvPr/>
+        </p:nvSpPr>
+        <p:spPr>
+          <a:xfrm>
+            <a:off x="7803450" y="4127979"/>
+            <a:ext cx="1984786" cy="577081"/>
+          </a:xfrm>
+          <a:prstGeom prst="rect">
+            <a:avLst/>
+          </a:prstGeom>
+          <a:noFill/>
+        </p:spPr>
+        <p:txBody>
+          <a:bodyPr wrap="square" rtlCol="0">
+            <a:spAutoFit/>
+          </a:bodyPr>
+          <a:lstStyle/>
+          <a:p>
+            <a:pPr algn="ctr"/>
+            <a:r>
+              <a:rPr lang="en-US" sz="1050" b="1" dirty="0"/>
+              <a:t>P</a:t>
+            </a:r>
+          </a:p>
+          <a:p>
+            <a:pPr algn="ctr"/>
+            <a:r>
+              <a:rPr lang="en-US" sz="1050" b="1" dirty="0"/>
+              <a:t>Vowel</a:t>
+            </a:r>
+          </a:p>
+          <a:p>
+            <a:pPr algn="ctr"/>
+            <a:r>
+              <a:rPr lang="en-US" sz="1050" b="1" dirty="0"/>
+              <a:t>Even</a:t>
+            </a:r>
+          </a:p>
+        </p:txBody>
+      </p:sp>
+      <p:sp>
+        <p:nvSpPr>
+          <p:cNvPr id="86" name="TextBox 85">
+            <a:extLst>
+              <a:ext uri="{FF2B5EF4-FFF2-40B4-BE49-F238E27FC236}">
+                <a16:creationId xmlns:a16="http://schemas.microsoft.com/office/drawing/2014/main" id="{5B983C18-64B9-4FC1-AF09-E9B5F1899C5A}"/>
+              </a:ext>
+            </a:extLst>
+          </p:cNvPr>
+          <p:cNvSpPr txBox="1"/>
+          <p:nvPr/>
+        </p:nvSpPr>
+        <p:spPr>
+          <a:xfrm>
+            <a:off x="7441548" y="3904222"/>
+            <a:ext cx="958528" cy="253916"/>
+          </a:xfrm>
+          <a:prstGeom prst="rect">
+            <a:avLst/>
+          </a:prstGeom>
+          <a:noFill/>
+        </p:spPr>
+        <p:txBody>
+          <a:bodyPr wrap="square" rtlCol="0">
+            <a:spAutoFit/>
+          </a:bodyPr>
+          <a:lstStyle/>
+          <a:p>
+            <a:r>
+              <a:rPr lang="en-US" sz="1050" dirty="0"/>
+              <a:t>2</a:t>
+            </a:r>
+            <a:r>
+              <a:rPr lang="en-US" sz="1050" baseline="30000" dirty="0"/>
+              <a:t>nd</a:t>
+            </a:r>
+            <a:r>
+              <a:rPr lang="en-US" sz="1050" dirty="0"/>
+              <a:t> Stimulus</a:t>
+            </a:r>
+          </a:p>
+        </p:txBody>
+      </p:sp>
+      <p:sp>
+        <p:nvSpPr>
+          <p:cNvPr id="87" name="TextBox 86">
+            <a:extLst>
+              <a:ext uri="{FF2B5EF4-FFF2-40B4-BE49-F238E27FC236}">
+                <a16:creationId xmlns:a16="http://schemas.microsoft.com/office/drawing/2014/main" id="{C8FBB0BD-AE51-41F0-BDA8-53F548AB0503}"/>
+              </a:ext>
+            </a:extLst>
+          </p:cNvPr>
+          <p:cNvSpPr txBox="1"/>
+          <p:nvPr/>
+        </p:nvSpPr>
+        <p:spPr>
+          <a:xfrm>
+            <a:off x="6753233" y="5711552"/>
+            <a:ext cx="2206145" cy="253916"/>
+          </a:xfrm>
+          <a:prstGeom prst="rect">
+            <a:avLst/>
+          </a:prstGeom>
+          <a:noFill/>
+        </p:spPr>
+        <p:txBody>
+          <a:bodyPr wrap="square" rtlCol="0">
+            <a:spAutoFit/>
+          </a:bodyPr>
+          <a:lstStyle/>
+          <a:p>
+            <a:r>
+              <a:rPr lang="en-US" sz="1050" b="1" dirty="0"/>
+              <a:t>13 = Odd, </a:t>
+            </a:r>
+            <a:r>
+              <a:rPr lang="en-US" sz="1050" b="1" dirty="0">
+                <a:solidFill>
+                  <a:schemeClr val="accent1"/>
+                </a:solidFill>
+              </a:rPr>
+              <a:t>q = correct key press</a:t>
+            </a:r>
+          </a:p>
+        </p:txBody>
+      </p:sp>
+      <p:sp>
+        <p:nvSpPr>
+          <p:cNvPr id="89" name="TextBox 88">
+            <a:extLst>
+              <a:ext uri="{FF2B5EF4-FFF2-40B4-BE49-F238E27FC236}">
+                <a16:creationId xmlns:a16="http://schemas.microsoft.com/office/drawing/2014/main" id="{F4DB0294-A572-4BF0-93C9-CB20F51AD024}"/>
+              </a:ext>
+            </a:extLst>
+          </p:cNvPr>
+          <p:cNvSpPr txBox="1"/>
+          <p:nvPr/>
+        </p:nvSpPr>
+        <p:spPr>
+          <a:xfrm>
+            <a:off x="4870029" y="1615278"/>
+            <a:ext cx="1984786" cy="300082"/>
+          </a:xfrm>
+          <a:prstGeom prst="rect">
+            <a:avLst/>
+          </a:prstGeom>
+          <a:noFill/>
+        </p:spPr>
+        <p:txBody>
+          <a:bodyPr wrap="square" rtlCol="0">
+            <a:spAutoFit/>
+          </a:bodyPr>
+          <a:lstStyle/>
+          <a:p>
+            <a:pPr algn="ctr"/>
+            <a:r>
+              <a:rPr lang="en-US" sz="1350" b="1" dirty="0"/>
+              <a:t>Letter</a:t>
+            </a:r>
+          </a:p>
+        </p:txBody>
+      </p:sp>
+      <p:sp>
+        <p:nvSpPr>
+          <p:cNvPr id="91" name="TextBox 90">
+            <a:extLst>
+              <a:ext uri="{FF2B5EF4-FFF2-40B4-BE49-F238E27FC236}">
+                <a16:creationId xmlns:a16="http://schemas.microsoft.com/office/drawing/2014/main" id="{3557EA48-2F24-46F9-97D0-DFBA53940A73}"/>
+              </a:ext>
+            </a:extLst>
+          </p:cNvPr>
+          <p:cNvSpPr txBox="1"/>
+          <p:nvPr/>
+        </p:nvSpPr>
+        <p:spPr>
+          <a:xfrm>
+            <a:off x="6845397" y="4358972"/>
+            <a:ext cx="1984786" cy="300082"/>
+          </a:xfrm>
+          <a:prstGeom prst="rect">
+            <a:avLst/>
+          </a:prstGeom>
+          <a:noFill/>
+        </p:spPr>
+        <p:txBody>
+          <a:bodyPr wrap="square" rtlCol="0">
+            <a:spAutoFit/>
+          </a:bodyPr>
+          <a:lstStyle/>
+          <a:p>
+            <a:pPr algn="ctr"/>
+            <a:r>
+              <a:rPr lang="en-US" sz="1350" b="1" dirty="0"/>
+              <a:t>Number</a:t>
+            </a:r>
+          </a:p>
+        </p:txBody>
+      </p:sp>
+      <p:sp>
+        <p:nvSpPr>
+          <p:cNvPr id="92" name="TextBox 91">
+            <a:extLst>
+              <a:ext uri="{FF2B5EF4-FFF2-40B4-BE49-F238E27FC236}">
+                <a16:creationId xmlns:a16="http://schemas.microsoft.com/office/drawing/2014/main" id="{50EBAA24-9D00-4840-8949-C7A6A6E41376}"/>
+              </a:ext>
+            </a:extLst>
+          </p:cNvPr>
+          <p:cNvSpPr txBox="1"/>
+          <p:nvPr/>
+        </p:nvSpPr>
+        <p:spPr>
+          <a:xfrm>
+            <a:off x="7133059" y="880172"/>
+            <a:ext cx="1984786" cy="230832"/>
+          </a:xfrm>
+          <a:prstGeom prst="rect">
+            <a:avLst/>
+          </a:prstGeom>
+          <a:noFill/>
+        </p:spPr>
+        <p:txBody>
+          <a:bodyPr wrap="square" rtlCol="0">
+            <a:spAutoFit/>
+          </a:bodyPr>
+          <a:lstStyle/>
+          <a:p>
+            <a:pPr algn="ctr"/>
+            <a:r>
+              <a:rPr lang="en-US" sz="900" dirty="0"/>
+              <a:t>(CV -&gt; OE / Letter-&gt; Number)</a:t>
+            </a:r>
+          </a:p>
+        </p:txBody>
+      </p:sp>
+      <p:sp>
+        <p:nvSpPr>
+          <p:cNvPr id="35" name="Arrow: Down 34">
+            <a:extLst>
+              <a:ext uri="{FF2B5EF4-FFF2-40B4-BE49-F238E27FC236}">
+                <a16:creationId xmlns:a16="http://schemas.microsoft.com/office/drawing/2014/main" id="{011C8683-7604-4077-BF99-2F6DE2841E41}"/>
+              </a:ext>
+            </a:extLst>
+          </p:cNvPr>
+          <p:cNvSpPr/>
+          <p:nvPr/>
+        </p:nvSpPr>
+        <p:spPr>
+          <a:xfrm rot="19752251">
+            <a:off x="7060820" y="3010747"/>
+            <a:ext cx="413412" cy="789764"/>
+          </a:xfrm>
+          <a:prstGeom prst="downArrow">
+            <a:avLst/>
+          </a:prstGeom>
+        </p:spPr>
+        <p:style>
+          <a:lnRef idx="2">
+            <a:schemeClr val="accent1">
+              <a:shade val="50000"/>
+            </a:schemeClr>
+          </a:lnRef>
+          <a:fillRef idx="1">
+            <a:schemeClr val="accent1"/>
+          </a:fillRef>
+          <a:effectRef idx="0">
+            <a:schemeClr val="accent1"/>
+          </a:effectRef>
+          <a:fontRef idx="minor">
+            <a:schemeClr val="lt1"/>
+          </a:fontRef>
+        </p:style>
+        <p:txBody>
+          <a:bodyPr rtlCol="0" anchor="ctr"/>
+          <a:lstStyle/>
+          <a:p>
+            <a:pPr algn="ctr"/>
+            <a:endParaRPr lang="en-US" sz="1350" dirty="0"/>
+          </a:p>
+        </p:txBody>
+      </p:sp>
+      <p:sp>
+        <p:nvSpPr>
+          <p:cNvPr id="37" name="TextBox 36">
+            <a:extLst>
+              <a:ext uri="{FF2B5EF4-FFF2-40B4-BE49-F238E27FC236}">
+                <a16:creationId xmlns:a16="http://schemas.microsoft.com/office/drawing/2014/main" id="{04D720A3-DB17-4D60-80B8-1033C1626E31}"/>
+              </a:ext>
+            </a:extLst>
+          </p:cNvPr>
+          <p:cNvSpPr txBox="1"/>
+          <p:nvPr/>
+        </p:nvSpPr>
+        <p:spPr>
+          <a:xfrm>
+            <a:off x="-777240" y="5787643"/>
+            <a:ext cx="1905000" cy="300082"/>
+          </a:xfrm>
+          <a:prstGeom prst="rect">
+            <a:avLst/>
+          </a:prstGeom>
+          <a:noFill/>
+        </p:spPr>
+        <p:txBody>
+          <a:bodyPr wrap="square" rtlCol="0">
+            <a:spAutoFit/>
+          </a:bodyPr>
+          <a:lstStyle/>
+          <a:p>
+            <a:pPr algn="r"/>
+            <a:r>
+              <a:rPr lang="en-US" sz="1350" dirty="0">
+                <a:solidFill>
+                  <a:schemeClr val="accent3"/>
+                </a:solidFill>
+              </a:rPr>
+              <a:t>(2067) Namias</a:t>
+            </a:r>
+          </a:p>
+        </p:txBody>
+      </p:sp>
+    </p:spTree>
+    <p:extLst>
+      <p:ext uri="{BB962C8B-B14F-4D97-AF65-F5344CB8AC3E}">
+        <p14:creationId xmlns:p14="http://schemas.microsoft.com/office/powerpoint/2010/main" val="609009724"/>
+      </p:ext>
+    </p:extLst>
+  </p:cSld>
+  <p:clrMapOvr>
+    <a:masterClrMapping/>
+  </p:clrMapOvr>
+  <p:timing>
+    <p:tnLst>
+      <p:par>
+        <p:cTn id="1" dur="indefinite" restart="never" nodeType="tmRoot">
+          <p:childTnLst>
+            <p:seq concurrent="1" nextAc="seek">
+              <p:cTn id="2" dur="indefinite" nodeType="mainSeq">
+                <p:childTnLst>
+                  <p:par>
+                    <p:cTn id="3" fill="hold">
+                      <p:stCondLst>
+                        <p:cond delay="indefinite"/>
+                      </p:stCondLst>
+                      <p:childTnLst>
+                        <p:par>
+                          <p:cTn id="4" fill="hold">
+                            <p:stCondLst>
+                              <p:cond delay="0"/>
+                            </p:stCondLst>
+                            <p:childTnLst>
+                              <p:par>
+                                <p:cTn id="5" presetID="1" presetClass="entr" presetSubtype="0" fill="hold" grpId="0" nodeType="clickEffect">
+                                  <p:stCondLst>
+                                    <p:cond delay="0"/>
+                                  </p:stCondLst>
+                                  <p:childTnLst>
+                                    <p:set>
+                                      <p:cBhvr>
+                                        <p:cTn id="6" dur="1" fill="hold">
+                                          <p:stCondLst>
+                                            <p:cond delay="0"/>
+                                          </p:stCondLst>
+                                        </p:cTn>
+                                        <p:tgtEl>
+                                          <p:spTgt spid="13"/>
+                                        </p:tgtEl>
+                                        <p:attrNameLst>
+                                          <p:attrName>style.visibility</p:attrName>
+                                        </p:attrNameLst>
+                                      </p:cBhvr>
+                                      <p:to>
+                                        <p:strVal val="visible"/>
+                                      </p:to>
+                                    </p:set>
+                                  </p:childTnLst>
+                                </p:cTn>
+                              </p:par>
+                              <p:par>
+                                <p:cTn id="7" presetID="1" presetClass="entr" presetSubtype="0" fill="hold" grpId="0" nodeType="withEffect">
+                                  <p:stCondLst>
+                                    <p:cond delay="0"/>
+                                  </p:stCondLst>
+                                  <p:childTnLst>
+                                    <p:set>
+                                      <p:cBhvr>
+                                        <p:cTn id="8" dur="1" fill="hold">
+                                          <p:stCondLst>
+                                            <p:cond delay="0"/>
+                                          </p:stCondLst>
+                                        </p:cTn>
+                                        <p:tgtEl>
+                                          <p:spTgt spid="56"/>
+                                        </p:tgtEl>
+                                        <p:attrNameLst>
+                                          <p:attrName>style.visibility</p:attrName>
+                                        </p:attrNameLst>
+                                      </p:cBhvr>
+                                      <p:to>
+                                        <p:strVal val="visible"/>
+                                      </p:to>
+                                    </p:set>
+                                  </p:childTnLst>
+                                </p:cTn>
+                              </p:par>
+                              <p:par>
+                                <p:cTn id="9" presetID="1" presetClass="entr" presetSubtype="0" fill="hold" grpId="0" nodeType="withEffect">
+                                  <p:stCondLst>
+                                    <p:cond delay="0"/>
+                                  </p:stCondLst>
+                                  <p:childTnLst>
+                                    <p:set>
+                                      <p:cBhvr>
+                                        <p:cTn id="10" dur="1" fill="hold">
+                                          <p:stCondLst>
+                                            <p:cond delay="0"/>
+                                          </p:stCondLst>
+                                        </p:cTn>
+                                        <p:tgtEl>
+                                          <p:spTgt spid="57"/>
+                                        </p:tgtEl>
+                                        <p:attrNameLst>
+                                          <p:attrName>style.visibility</p:attrName>
+                                        </p:attrNameLst>
+                                      </p:cBhvr>
+                                      <p:to>
+                                        <p:strVal val="visible"/>
+                                      </p:to>
+                                    </p:set>
+                                  </p:childTnLst>
+                                </p:cTn>
+                              </p:par>
+                              <p:par>
+                                <p:cTn id="11" presetID="1" presetClass="entr" presetSubtype="0" fill="hold" grpId="0" nodeType="withEffect">
+                                  <p:stCondLst>
+                                    <p:cond delay="0"/>
+                                  </p:stCondLst>
+                                  <p:childTnLst>
+                                    <p:set>
+                                      <p:cBhvr>
+                                        <p:cTn id="12" dur="1" fill="hold">
+                                          <p:stCondLst>
+                                            <p:cond delay="0"/>
+                                          </p:stCondLst>
+                                        </p:cTn>
+                                        <p:tgtEl>
+                                          <p:spTgt spid="58"/>
+                                        </p:tgtEl>
+                                        <p:attrNameLst>
+                                          <p:attrName>style.visibility</p:attrName>
+                                        </p:attrNameLst>
+                                      </p:cBhvr>
+                                      <p:to>
+                                        <p:strVal val="visible"/>
+                                      </p:to>
+                                    </p:set>
+                                  </p:childTnLst>
+                                </p:cTn>
+                              </p:par>
+                              <p:par>
+                                <p:cTn id="13" presetID="1" presetClass="entr" presetSubtype="0" fill="hold" grpId="0" nodeType="withEffect">
+                                  <p:stCondLst>
+                                    <p:cond delay="0"/>
+                                  </p:stCondLst>
+                                  <p:childTnLst>
+                                    <p:set>
+                                      <p:cBhvr>
+                                        <p:cTn id="14" dur="1" fill="hold">
+                                          <p:stCondLst>
+                                            <p:cond delay="0"/>
+                                          </p:stCondLst>
+                                        </p:cTn>
+                                        <p:tgtEl>
+                                          <p:spTgt spid="60"/>
+                                        </p:tgtEl>
+                                        <p:attrNameLst>
+                                          <p:attrName>style.visibility</p:attrName>
+                                        </p:attrNameLst>
+                                      </p:cBhvr>
+                                      <p:to>
+                                        <p:strVal val="visible"/>
+                                      </p:to>
+                                    </p:set>
+                                  </p:childTnLst>
+                                </p:cTn>
+                              </p:par>
+                              <p:par>
+                                <p:cTn id="15" presetID="1" presetClass="entr" presetSubtype="0" fill="hold" grpId="0" nodeType="withEffect">
+                                  <p:stCondLst>
+                                    <p:cond delay="0"/>
+                                  </p:stCondLst>
+                                  <p:childTnLst>
+                                    <p:set>
+                                      <p:cBhvr>
+                                        <p:cTn id="16" dur="1" fill="hold">
+                                          <p:stCondLst>
+                                            <p:cond delay="0"/>
+                                          </p:stCondLst>
+                                        </p:cTn>
+                                        <p:tgtEl>
+                                          <p:spTgt spid="59"/>
+                                        </p:tgtEl>
+                                        <p:attrNameLst>
+                                          <p:attrName>style.visibility</p:attrName>
+                                        </p:attrNameLst>
+                                      </p:cBhvr>
+                                      <p:to>
+                                        <p:strVal val="visible"/>
+                                      </p:to>
+                                    </p:set>
+                                  </p:childTnLst>
+                                </p:cTn>
+                              </p:par>
+                            </p:childTnLst>
+                          </p:cTn>
+                        </p:par>
+                      </p:childTnLst>
+                    </p:cTn>
+                  </p:par>
+                  <p:par>
+                    <p:cTn id="17" fill="hold">
+                      <p:stCondLst>
+                        <p:cond delay="indefinite"/>
+                      </p:stCondLst>
+                      <p:childTnLst>
+                        <p:par>
+                          <p:cTn id="18" fill="hold">
+                            <p:stCondLst>
+                              <p:cond delay="0"/>
+                            </p:stCondLst>
+                            <p:childTnLst>
+                              <p:par>
+                                <p:cTn id="19" presetID="1" presetClass="entr" presetSubtype="0" fill="hold" grpId="0" nodeType="clickEffect">
+                                  <p:stCondLst>
+                                    <p:cond delay="0"/>
+                                  </p:stCondLst>
+                                  <p:childTnLst>
+                                    <p:set>
+                                      <p:cBhvr>
+                                        <p:cTn id="20" dur="1" fill="hold">
+                                          <p:stCondLst>
+                                            <p:cond delay="0"/>
+                                          </p:stCondLst>
+                                        </p:cTn>
+                                        <p:tgtEl>
+                                          <p:spTgt spid="77"/>
+                                        </p:tgtEl>
+                                        <p:attrNameLst>
+                                          <p:attrName>style.visibility</p:attrName>
+                                        </p:attrNameLst>
+                                      </p:cBhvr>
+                                      <p:to>
+                                        <p:strVal val="visible"/>
+                                      </p:to>
+                                    </p:set>
+                                  </p:childTnLst>
+                                </p:cTn>
+                              </p:par>
+                              <p:par>
+                                <p:cTn id="21" presetID="1" presetClass="entr" presetSubtype="0" fill="hold" grpId="0" nodeType="withEffect">
+                                  <p:stCondLst>
+                                    <p:cond delay="0"/>
+                                  </p:stCondLst>
+                                  <p:childTnLst>
+                                    <p:set>
+                                      <p:cBhvr>
+                                        <p:cTn id="22" dur="1" fill="hold">
+                                          <p:stCondLst>
+                                            <p:cond delay="0"/>
+                                          </p:stCondLst>
+                                        </p:cTn>
+                                        <p:tgtEl>
+                                          <p:spTgt spid="78"/>
+                                        </p:tgtEl>
+                                        <p:attrNameLst>
+                                          <p:attrName>style.visibility</p:attrName>
+                                        </p:attrNameLst>
+                                      </p:cBhvr>
+                                      <p:to>
+                                        <p:strVal val="visible"/>
+                                      </p:to>
+                                    </p:set>
+                                  </p:childTnLst>
+                                </p:cTn>
+                              </p:par>
+                              <p:par>
+                                <p:cTn id="23" presetID="1" presetClass="entr" presetSubtype="0" fill="hold" grpId="0" nodeType="withEffect">
+                                  <p:stCondLst>
+                                    <p:cond delay="0"/>
+                                  </p:stCondLst>
+                                  <p:childTnLst>
+                                    <p:set>
+                                      <p:cBhvr>
+                                        <p:cTn id="24" dur="1" fill="hold">
+                                          <p:stCondLst>
+                                            <p:cond delay="0"/>
+                                          </p:stCondLst>
+                                        </p:cTn>
+                                        <p:tgtEl>
+                                          <p:spTgt spid="80"/>
+                                        </p:tgtEl>
+                                        <p:attrNameLst>
+                                          <p:attrName>style.visibility</p:attrName>
+                                        </p:attrNameLst>
+                                      </p:cBhvr>
+                                      <p:to>
+                                        <p:strVal val="visible"/>
+                                      </p:to>
+                                    </p:set>
+                                  </p:childTnLst>
+                                </p:cTn>
+                              </p:par>
+                              <p:par>
+                                <p:cTn id="25" presetID="1" presetClass="entr" presetSubtype="0" fill="hold" grpId="0" nodeType="withEffect">
+                                  <p:stCondLst>
+                                    <p:cond delay="0"/>
+                                  </p:stCondLst>
+                                  <p:childTnLst>
+                                    <p:set>
+                                      <p:cBhvr>
+                                        <p:cTn id="26" dur="1" fill="hold">
+                                          <p:stCondLst>
+                                            <p:cond delay="0"/>
+                                          </p:stCondLst>
+                                        </p:cTn>
+                                        <p:tgtEl>
+                                          <p:spTgt spid="79"/>
+                                        </p:tgtEl>
+                                        <p:attrNameLst>
+                                          <p:attrName>style.visibility</p:attrName>
+                                        </p:attrNameLst>
+                                      </p:cBhvr>
+                                      <p:to>
+                                        <p:strVal val="visible"/>
+                                      </p:to>
+                                    </p:set>
+                                  </p:childTnLst>
+                                </p:cTn>
+                              </p:par>
+                              <p:par>
+                                <p:cTn id="27" presetID="1" presetClass="entr" presetSubtype="0" fill="hold" grpId="0" nodeType="withEffect">
+                                  <p:stCondLst>
+                                    <p:cond delay="0"/>
+                                  </p:stCondLst>
+                                  <p:childTnLst>
+                                    <p:set>
+                                      <p:cBhvr>
+                                        <p:cTn id="28" dur="1" fill="hold">
+                                          <p:stCondLst>
+                                            <p:cond delay="0"/>
+                                          </p:stCondLst>
+                                        </p:cTn>
+                                        <p:tgtEl>
+                                          <p:spTgt spid="81"/>
+                                        </p:tgtEl>
+                                        <p:attrNameLst>
+                                          <p:attrName>style.visibility</p:attrName>
+                                        </p:attrNameLst>
+                                      </p:cBhvr>
+                                      <p:to>
+                                        <p:strVal val="visible"/>
+                                      </p:to>
+                                    </p:set>
+                                  </p:childTnLst>
+                                </p:cTn>
+                              </p:par>
+                              <p:par>
+                                <p:cTn id="29" presetID="1" presetClass="entr" presetSubtype="0" fill="hold" grpId="0" nodeType="withEffect">
+                                  <p:stCondLst>
+                                    <p:cond delay="0"/>
+                                  </p:stCondLst>
+                                  <p:childTnLst>
+                                    <p:set>
+                                      <p:cBhvr>
+                                        <p:cTn id="30" dur="1" fill="hold">
+                                          <p:stCondLst>
+                                            <p:cond delay="0"/>
+                                          </p:stCondLst>
+                                        </p:cTn>
+                                        <p:tgtEl>
+                                          <p:spTgt spid="76"/>
+                                        </p:tgtEl>
+                                        <p:attrNameLst>
+                                          <p:attrName>style.visibility</p:attrName>
+                                        </p:attrNameLst>
+                                      </p:cBhvr>
+                                      <p:to>
+                                        <p:strVal val="visible"/>
+                                      </p:to>
+                                    </p:set>
+                                  </p:childTnLst>
+                                </p:cTn>
+                              </p:par>
+                              <p:par>
+                                <p:cTn id="31" presetID="1" presetClass="entr" presetSubtype="0" fill="hold" grpId="0" nodeType="withEffect">
+                                  <p:stCondLst>
+                                    <p:cond delay="0"/>
+                                  </p:stCondLst>
+                                  <p:childTnLst>
+                                    <p:set>
+                                      <p:cBhvr>
+                                        <p:cTn id="32" dur="1" fill="hold">
+                                          <p:stCondLst>
+                                            <p:cond delay="0"/>
+                                          </p:stCondLst>
+                                        </p:cTn>
+                                        <p:tgtEl>
+                                          <p:spTgt spid="16"/>
+                                        </p:tgtEl>
+                                        <p:attrNameLst>
+                                          <p:attrName>style.visibility</p:attrName>
+                                        </p:attrNameLst>
+                                      </p:cBhvr>
+                                      <p:to>
+                                        <p:strVal val="visible"/>
+                                      </p:to>
+                                    </p:set>
+                                  </p:childTnLst>
+                                </p:cTn>
+                              </p:par>
+                            </p:childTnLst>
+                          </p:cTn>
+                        </p:par>
+                      </p:childTnLst>
+                    </p:cTn>
+                  </p:par>
+                  <p:par>
+                    <p:cTn id="33" fill="hold">
+                      <p:stCondLst>
+                        <p:cond delay="indefinite"/>
+                      </p:stCondLst>
+                      <p:childTnLst>
+                        <p:par>
+                          <p:cTn id="34" fill="hold">
+                            <p:stCondLst>
+                              <p:cond delay="0"/>
+                            </p:stCondLst>
+                            <p:childTnLst>
+                              <p:par>
+                                <p:cTn id="35" presetID="1" presetClass="entr" presetSubtype="0" fill="hold" grpId="0" nodeType="clickEffect">
+                                  <p:stCondLst>
+                                    <p:cond delay="0"/>
+                                  </p:stCondLst>
+                                  <p:childTnLst>
+                                    <p:set>
+                                      <p:cBhvr>
+                                        <p:cTn id="36" dur="1" fill="hold">
+                                          <p:stCondLst>
+                                            <p:cond delay="0"/>
+                                          </p:stCondLst>
+                                        </p:cTn>
+                                        <p:tgtEl>
+                                          <p:spTgt spid="92"/>
+                                        </p:tgtEl>
+                                        <p:attrNameLst>
+                                          <p:attrName>style.visibility</p:attrName>
+                                        </p:attrNameLst>
+                                      </p:cBhvr>
+                                      <p:to>
+                                        <p:strVal val="visible"/>
+                                      </p:to>
+                                    </p:set>
+                                  </p:childTnLst>
+                                </p:cTn>
+                              </p:par>
+                              <p:par>
+                                <p:cTn id="37" presetID="1" presetClass="entr" presetSubtype="0" fill="hold" grpId="0" nodeType="withEffect">
+                                  <p:stCondLst>
+                                    <p:cond delay="0"/>
+                                  </p:stCondLst>
+                                  <p:childTnLst>
+                                    <p:set>
+                                      <p:cBhvr>
+                                        <p:cTn id="38" dur="1" fill="hold">
+                                          <p:stCondLst>
+                                            <p:cond delay="0"/>
+                                          </p:stCondLst>
+                                        </p:cTn>
+                                        <p:tgtEl>
+                                          <p:spTgt spid="28"/>
+                                        </p:tgtEl>
+                                        <p:attrNameLst>
+                                          <p:attrName>style.visibility</p:attrName>
+                                        </p:attrNameLst>
+                                      </p:cBhvr>
+                                      <p:to>
+                                        <p:strVal val="visible"/>
+                                      </p:to>
+                                    </p:set>
+                                  </p:childTnLst>
+                                </p:cTn>
+                              </p:par>
+                            </p:childTnLst>
+                          </p:cTn>
+                        </p:par>
+                      </p:childTnLst>
+                    </p:cTn>
+                  </p:par>
+                  <p:par>
+                    <p:cTn id="39" fill="hold">
+                      <p:stCondLst>
+                        <p:cond delay="indefinite"/>
+                      </p:stCondLst>
+                      <p:childTnLst>
+                        <p:par>
+                          <p:cTn id="40" fill="hold">
+                            <p:stCondLst>
+                              <p:cond delay="0"/>
+                            </p:stCondLst>
+                            <p:childTnLst>
+                              <p:par>
+                                <p:cTn id="41" presetID="1" presetClass="entr" presetSubtype="0" fill="hold" grpId="0" nodeType="clickEffect">
+                                  <p:stCondLst>
+                                    <p:cond delay="0"/>
+                                  </p:stCondLst>
+                                  <p:childTnLst>
+                                    <p:set>
+                                      <p:cBhvr>
+                                        <p:cTn id="42" dur="1" fill="hold">
+                                          <p:stCondLst>
+                                            <p:cond delay="0"/>
+                                          </p:stCondLst>
+                                        </p:cTn>
+                                        <p:tgtEl>
+                                          <p:spTgt spid="71"/>
+                                        </p:tgtEl>
+                                        <p:attrNameLst>
+                                          <p:attrName>style.visibility</p:attrName>
+                                        </p:attrNameLst>
+                                      </p:cBhvr>
+                                      <p:to>
+                                        <p:strVal val="visible"/>
+                                      </p:to>
+                                    </p:set>
+                                  </p:childTnLst>
+                                </p:cTn>
+                              </p:par>
+                              <p:par>
+                                <p:cTn id="43" presetID="1" presetClass="entr" presetSubtype="0" fill="hold" grpId="0" nodeType="withEffect">
+                                  <p:stCondLst>
+                                    <p:cond delay="0"/>
+                                  </p:stCondLst>
+                                  <p:childTnLst>
+                                    <p:set>
+                                      <p:cBhvr>
+                                        <p:cTn id="44" dur="1" fill="hold">
+                                          <p:stCondLst>
+                                            <p:cond delay="0"/>
+                                          </p:stCondLst>
+                                        </p:cTn>
+                                        <p:tgtEl>
+                                          <p:spTgt spid="75"/>
+                                        </p:tgtEl>
+                                        <p:attrNameLst>
+                                          <p:attrName>style.visibility</p:attrName>
+                                        </p:attrNameLst>
+                                      </p:cBhvr>
+                                      <p:to>
+                                        <p:strVal val="visible"/>
+                                      </p:to>
+                                    </p:set>
+                                  </p:childTnLst>
+                                </p:cTn>
+                              </p:par>
+                              <p:par>
+                                <p:cTn id="45" presetID="1" presetClass="entr" presetSubtype="0" fill="hold" grpId="0" nodeType="withEffect">
+                                  <p:stCondLst>
+                                    <p:cond delay="0"/>
+                                  </p:stCondLst>
+                                  <p:childTnLst>
+                                    <p:set>
+                                      <p:cBhvr>
+                                        <p:cTn id="46" dur="1" fill="hold">
+                                          <p:stCondLst>
+                                            <p:cond delay="0"/>
+                                          </p:stCondLst>
+                                        </p:cTn>
+                                        <p:tgtEl>
+                                          <p:spTgt spid="89"/>
+                                        </p:tgtEl>
+                                        <p:attrNameLst>
+                                          <p:attrName>style.visibility</p:attrName>
+                                        </p:attrNameLst>
+                                      </p:cBhvr>
+                                      <p:to>
+                                        <p:strVal val="visible"/>
+                                      </p:to>
+                                    </p:set>
+                                  </p:childTnLst>
+                                </p:cTn>
+                              </p:par>
+                              <p:par>
+                                <p:cTn id="47" presetID="1" presetClass="entr" presetSubtype="0" fill="hold" grpId="0" nodeType="withEffect">
+                                  <p:stCondLst>
+                                    <p:cond delay="0"/>
+                                  </p:stCondLst>
+                                  <p:childTnLst>
+                                    <p:set>
+                                      <p:cBhvr>
+                                        <p:cTn id="48" dur="1" fill="hold">
+                                          <p:stCondLst>
+                                            <p:cond delay="0"/>
+                                          </p:stCondLst>
+                                        </p:cTn>
+                                        <p:tgtEl>
+                                          <p:spTgt spid="70"/>
+                                        </p:tgtEl>
+                                        <p:attrNameLst>
+                                          <p:attrName>style.visibility</p:attrName>
+                                        </p:attrNameLst>
+                                      </p:cBhvr>
+                                      <p:to>
+                                        <p:strVal val="visible"/>
+                                      </p:to>
+                                    </p:set>
+                                  </p:childTnLst>
+                                </p:cTn>
+                              </p:par>
+                              <p:par>
+                                <p:cTn id="49" presetID="1" presetClass="entr" presetSubtype="0" fill="hold" grpId="0" nodeType="withEffect">
+                                  <p:stCondLst>
+                                    <p:cond delay="0"/>
+                                  </p:stCondLst>
+                                  <p:childTnLst>
+                                    <p:set>
+                                      <p:cBhvr>
+                                        <p:cTn id="50" dur="1" fill="hold">
+                                          <p:stCondLst>
+                                            <p:cond delay="0"/>
+                                          </p:stCondLst>
+                                        </p:cTn>
+                                        <p:tgtEl>
+                                          <p:spTgt spid="72"/>
+                                        </p:tgtEl>
+                                        <p:attrNameLst>
+                                          <p:attrName>style.visibility</p:attrName>
+                                        </p:attrNameLst>
+                                      </p:cBhvr>
+                                      <p:to>
+                                        <p:strVal val="visible"/>
+                                      </p:to>
+                                    </p:set>
+                                  </p:childTnLst>
+                                </p:cTn>
+                              </p:par>
+                              <p:par>
+                                <p:cTn id="51" presetID="1" presetClass="entr" presetSubtype="0" fill="hold" grpId="0" nodeType="withEffect">
+                                  <p:stCondLst>
+                                    <p:cond delay="0"/>
+                                  </p:stCondLst>
+                                  <p:childTnLst>
+                                    <p:set>
+                                      <p:cBhvr>
+                                        <p:cTn id="52" dur="1" fill="hold">
+                                          <p:stCondLst>
+                                            <p:cond delay="0"/>
+                                          </p:stCondLst>
+                                        </p:cTn>
+                                        <p:tgtEl>
+                                          <p:spTgt spid="68"/>
+                                        </p:tgtEl>
+                                        <p:attrNameLst>
+                                          <p:attrName>style.visibility</p:attrName>
+                                        </p:attrNameLst>
+                                      </p:cBhvr>
+                                      <p:to>
+                                        <p:strVal val="visible"/>
+                                      </p:to>
+                                    </p:set>
+                                  </p:childTnLst>
+                                </p:cTn>
+                              </p:par>
+                              <p:par>
+                                <p:cTn id="53" presetID="1" presetClass="entr" presetSubtype="0" fill="hold" grpId="0" nodeType="withEffect">
+                                  <p:stCondLst>
+                                    <p:cond delay="0"/>
+                                  </p:stCondLst>
+                                  <p:childTnLst>
+                                    <p:set>
+                                      <p:cBhvr>
+                                        <p:cTn id="54" dur="1" fill="hold">
+                                          <p:stCondLst>
+                                            <p:cond delay="0"/>
+                                          </p:stCondLst>
+                                        </p:cTn>
+                                        <p:tgtEl>
+                                          <p:spTgt spid="73"/>
+                                        </p:tgtEl>
+                                        <p:attrNameLst>
+                                          <p:attrName>style.visibility</p:attrName>
+                                        </p:attrNameLst>
+                                      </p:cBhvr>
+                                      <p:to>
+                                        <p:strVal val="visible"/>
+                                      </p:to>
+                                    </p:set>
+                                  </p:childTnLst>
+                                </p:cTn>
+                              </p:par>
+                            </p:childTnLst>
+                          </p:cTn>
+                        </p:par>
+                      </p:childTnLst>
+                    </p:cTn>
+                  </p:par>
+                  <p:par>
+                    <p:cTn id="55" fill="hold">
+                      <p:stCondLst>
+                        <p:cond delay="indefinite"/>
+                      </p:stCondLst>
+                      <p:childTnLst>
+                        <p:par>
+                          <p:cTn id="56" fill="hold">
+                            <p:stCondLst>
+                              <p:cond delay="0"/>
+                            </p:stCondLst>
+                            <p:childTnLst>
+                              <p:par>
+                                <p:cTn id="57" presetID="1" presetClass="entr" presetSubtype="0" fill="hold" grpId="0" nodeType="clickEffect">
+                                  <p:stCondLst>
+                                    <p:cond delay="0"/>
+                                  </p:stCondLst>
+                                  <p:childTnLst>
+                                    <p:set>
+                                      <p:cBhvr>
+                                        <p:cTn id="58" dur="1" fill="hold">
+                                          <p:stCondLst>
+                                            <p:cond delay="0"/>
+                                          </p:stCondLst>
+                                        </p:cTn>
+                                        <p:tgtEl>
+                                          <p:spTgt spid="82"/>
+                                        </p:tgtEl>
+                                        <p:attrNameLst>
+                                          <p:attrName>style.visibility</p:attrName>
+                                        </p:attrNameLst>
+                                      </p:cBhvr>
+                                      <p:to>
+                                        <p:strVal val="visible"/>
+                                      </p:to>
+                                    </p:set>
+                                  </p:childTnLst>
+                                </p:cTn>
+                              </p:par>
+                              <p:par>
+                                <p:cTn id="59" presetID="1" presetClass="entr" presetSubtype="0" fill="hold" grpId="0" nodeType="withEffect">
+                                  <p:stCondLst>
+                                    <p:cond delay="0"/>
+                                  </p:stCondLst>
+                                  <p:childTnLst>
+                                    <p:set>
+                                      <p:cBhvr>
+                                        <p:cTn id="60" dur="1" fill="hold">
+                                          <p:stCondLst>
+                                            <p:cond delay="0"/>
+                                          </p:stCondLst>
+                                        </p:cTn>
+                                        <p:tgtEl>
+                                          <p:spTgt spid="83"/>
+                                        </p:tgtEl>
+                                        <p:attrNameLst>
+                                          <p:attrName>style.visibility</p:attrName>
+                                        </p:attrNameLst>
+                                      </p:cBhvr>
+                                      <p:to>
+                                        <p:strVal val="visible"/>
+                                      </p:to>
+                                    </p:set>
+                                  </p:childTnLst>
+                                </p:cTn>
+                              </p:par>
+                              <p:par>
+                                <p:cTn id="61" presetID="1" presetClass="entr" presetSubtype="0" fill="hold" grpId="0" nodeType="withEffect">
+                                  <p:stCondLst>
+                                    <p:cond delay="0"/>
+                                  </p:stCondLst>
+                                  <p:childTnLst>
+                                    <p:set>
+                                      <p:cBhvr>
+                                        <p:cTn id="62" dur="1" fill="hold">
+                                          <p:stCondLst>
+                                            <p:cond delay="0"/>
+                                          </p:stCondLst>
+                                        </p:cTn>
+                                        <p:tgtEl>
+                                          <p:spTgt spid="84"/>
+                                        </p:tgtEl>
+                                        <p:attrNameLst>
+                                          <p:attrName>style.visibility</p:attrName>
+                                        </p:attrNameLst>
+                                      </p:cBhvr>
+                                      <p:to>
+                                        <p:strVal val="visible"/>
+                                      </p:to>
+                                    </p:set>
+                                  </p:childTnLst>
+                                </p:cTn>
+                              </p:par>
+                              <p:par>
+                                <p:cTn id="63" presetID="1" presetClass="entr" presetSubtype="0" fill="hold" grpId="0" nodeType="withEffect">
+                                  <p:stCondLst>
+                                    <p:cond delay="0"/>
+                                  </p:stCondLst>
+                                  <p:childTnLst>
+                                    <p:set>
+                                      <p:cBhvr>
+                                        <p:cTn id="64" dur="1" fill="hold">
+                                          <p:stCondLst>
+                                            <p:cond delay="0"/>
+                                          </p:stCondLst>
+                                        </p:cTn>
+                                        <p:tgtEl>
+                                          <p:spTgt spid="86"/>
+                                        </p:tgtEl>
+                                        <p:attrNameLst>
+                                          <p:attrName>style.visibility</p:attrName>
+                                        </p:attrNameLst>
+                                      </p:cBhvr>
+                                      <p:to>
+                                        <p:strVal val="visible"/>
+                                      </p:to>
+                                    </p:set>
+                                  </p:childTnLst>
+                                </p:cTn>
+                              </p:par>
+                              <p:par>
+                                <p:cTn id="65" presetID="1" presetClass="entr" presetSubtype="0" fill="hold" grpId="0" nodeType="withEffect">
+                                  <p:stCondLst>
+                                    <p:cond delay="0"/>
+                                  </p:stCondLst>
+                                  <p:childTnLst>
+                                    <p:set>
+                                      <p:cBhvr>
+                                        <p:cTn id="66" dur="1" fill="hold">
+                                          <p:stCondLst>
+                                            <p:cond delay="0"/>
+                                          </p:stCondLst>
+                                        </p:cTn>
+                                        <p:tgtEl>
+                                          <p:spTgt spid="87"/>
+                                        </p:tgtEl>
+                                        <p:attrNameLst>
+                                          <p:attrName>style.visibility</p:attrName>
+                                        </p:attrNameLst>
+                                      </p:cBhvr>
+                                      <p:to>
+                                        <p:strVal val="visible"/>
+                                      </p:to>
+                                    </p:set>
+                                  </p:childTnLst>
+                                </p:cTn>
+                              </p:par>
+                              <p:par>
+                                <p:cTn id="67" presetID="1" presetClass="entr" presetSubtype="0" fill="hold" grpId="0" nodeType="withEffect">
+                                  <p:stCondLst>
+                                    <p:cond delay="0"/>
+                                  </p:stCondLst>
+                                  <p:childTnLst>
+                                    <p:set>
+                                      <p:cBhvr>
+                                        <p:cTn id="68" dur="1" fill="hold">
+                                          <p:stCondLst>
+                                            <p:cond delay="0"/>
+                                          </p:stCondLst>
+                                        </p:cTn>
+                                        <p:tgtEl>
+                                          <p:spTgt spid="91"/>
+                                        </p:tgtEl>
+                                        <p:attrNameLst>
+                                          <p:attrName>style.visibility</p:attrName>
+                                        </p:attrNameLst>
+                                      </p:cBhvr>
+                                      <p:to>
+                                        <p:strVal val="visible"/>
+                                      </p:to>
+                                    </p:set>
+                                  </p:childTnLst>
+                                </p:cTn>
+                              </p:par>
+                              <p:par>
+                                <p:cTn id="69" presetID="1" presetClass="entr" presetSubtype="0" fill="hold" grpId="0" nodeType="withEffect">
+                                  <p:stCondLst>
+                                    <p:cond delay="0"/>
+                                  </p:stCondLst>
+                                  <p:childTnLst>
+                                    <p:set>
+                                      <p:cBhvr>
+                                        <p:cTn id="70" dur="1" fill="hold">
+                                          <p:stCondLst>
+                                            <p:cond delay="0"/>
+                                          </p:stCondLst>
+                                        </p:cTn>
+                                        <p:tgtEl>
+                                          <p:spTgt spid="35"/>
+                                        </p:tgtEl>
+                                        <p:attrNameLst>
+                                          <p:attrName>style.visibility</p:attrName>
+                                        </p:attrNameLst>
+                                      </p:cBhvr>
+                                      <p:to>
+                                        <p:strVal val="visible"/>
+                                      </p:to>
+                                    </p:set>
+                                  </p:childTnLst>
+                                </p:cTn>
+                              </p:par>
+                              <p:par>
+                                <p:cTn id="71" presetID="1" presetClass="entr" presetSubtype="0" fill="hold" grpId="0" nodeType="withEffect">
+                                  <p:stCondLst>
+                                    <p:cond delay="0"/>
+                                  </p:stCondLst>
+                                  <p:childTnLst>
+                                    <p:set>
+                                      <p:cBhvr>
+                                        <p:cTn id="72" dur="1" fill="hold">
+                                          <p:stCondLst>
+                                            <p:cond delay="0"/>
+                                          </p:stCondLst>
+                                        </p:cTn>
+                                        <p:tgtEl>
+                                          <p:spTgt spid="85"/>
+                                        </p:tgtEl>
+                                        <p:attrNameLst>
+                                          <p:attrName>style.visibility</p:attrName>
+                                        </p:attrNameLst>
+                                      </p:cBhvr>
+                                      <p:to>
+                                        <p:strVal val="visible"/>
+                                      </p:to>
+                                    </p:set>
+                                  </p:childTnLst>
+                                </p:cTn>
+                              </p:par>
+                            </p:childTnLst>
+                          </p:cTn>
+                        </p:par>
+                      </p:childTnLst>
+                    </p:cTn>
+                  </p:par>
+                </p:childTnLst>
+              </p:cTn>
+              <p:prevCondLst>
+                <p:cond evt="onPrev" delay="0">
+                  <p:tgtEl>
+                    <p:sldTgt/>
+                  </p:tgtEl>
+                </p:cond>
+              </p:prevCondLst>
+              <p:nextCondLst>
+                <p:cond evt="onNext" delay="0">
+                  <p:tgtEl>
+                    <p:sldTgt/>
+                  </p:tgtEl>
+                </p:cond>
+              </p:nextCondLst>
+            </p:seq>
+          </p:childTnLst>
+        </p:cTn>
+      </p:par>
+    </p:tnLst>
+    <p:bldLst>
+      <p:bldP spid="13" grpId="0" animBg="1"/>
+      <p:bldP spid="16" grpId="0" animBg="1"/>
+      <p:bldP spid="28" grpId="0" animBg="1"/>
+      <p:bldP spid="56" grpId="0"/>
+      <p:bldP spid="57" grpId="0"/>
+      <p:bldP spid="58" grpId="0"/>
+      <p:bldP spid="59" grpId="0"/>
+      <p:bldP spid="60" grpId="0"/>
+      <p:bldP spid="68" grpId="0"/>
+      <p:bldP spid="70" grpId="0" animBg="1"/>
+      <p:bldP spid="71" grpId="0"/>
+      <p:bldP spid="72" grpId="0"/>
+      <p:bldP spid="73" grpId="0"/>
+      <p:bldP spid="75" grpId="0"/>
+      <p:bldP spid="76" grpId="0" animBg="1"/>
+      <p:bldP spid="77" grpId="0"/>
+      <p:bldP spid="78" grpId="0"/>
+      <p:bldP spid="79" grpId="0"/>
+      <p:bldP spid="80" grpId="0"/>
+      <p:bldP spid="81" grpId="0"/>
+      <p:bldP spid="82" grpId="0" animBg="1"/>
+      <p:bldP spid="83" grpId="0"/>
+      <p:bldP spid="84" grpId="0"/>
+      <p:bldP spid="85" grpId="0"/>
+      <p:bldP spid="86" grpId="0"/>
+      <p:bldP spid="87" grpId="0"/>
+      <p:bldP spid="89" grpId="0"/>
+      <p:bldP spid="91" grpId="0"/>
+      <p:bldP spid="92" grpId="0"/>
+      <p:bldP spid="35" grpId="0" animBg="1"/>
+    </p:bldLst>
+  </p:timing>
+</p:sld>
+</file>
+
+<file path=ppt/slides/slide3.xml><?xml version="1.0" encoding="utf-8"?>
 <p:sld xmlns:a="http://schemas.openxmlformats.org/drawingml/2006/main" xmlns:r="http://schemas.openxmlformats.org/officeDocument/2006/relationships" xmlns:p="http://schemas.openxmlformats.org/presentationml/2006/main">
   <p:cSld>
     <p:spTree>
@@ -4780,7 +7529,7 @@
 </p:sld>
 </file>
 
-<file path=ppt/slides/slide3.xml><?xml version="1.0" encoding="utf-8"?>
+<file path=ppt/slides/slide4.xml><?xml version="1.0" encoding="utf-8"?>
 <p:sld xmlns:a="http://schemas.openxmlformats.org/drawingml/2006/main" xmlns:r="http://schemas.openxmlformats.org/officeDocument/2006/relationships" xmlns:p="http://schemas.openxmlformats.org/presentationml/2006/main">
   <p:cSld>
     <p:spTree>
@@ -5021,142 +7770,6 @@
 </p:sld>
 </file>
 
-<file path=ppt/slides/slide4.xml><?xml version="1.0" encoding="utf-8"?>
-<p:sld xmlns:a="http://schemas.openxmlformats.org/drawingml/2006/main" xmlns:r="http://schemas.openxmlformats.org/officeDocument/2006/relationships" xmlns:p="http://schemas.openxmlformats.org/presentationml/2006/main">
-  <p:cSld>
-    <p:spTree>
-      <p:nvGrpSpPr>
-        <p:cNvPr id="1" name=""/>
-        <p:cNvGrpSpPr/>
-        <p:nvPr/>
-      </p:nvGrpSpPr>
-      <p:grpSpPr>
-        <a:xfrm>
-          <a:off x="0" y="0"/>
-          <a:ext cx="0" cy="0"/>
-          <a:chOff x="0" y="0"/>
-          <a:chExt cx="0" cy="0"/>
-        </a:xfrm>
-      </p:grpSpPr>
-      <p:sp>
-        <p:nvSpPr>
-          <p:cNvPr id="2" name="Title 1">
-            <a:extLst>
-              <a:ext uri="{FF2B5EF4-FFF2-40B4-BE49-F238E27FC236}">
-                <a16:creationId xmlns:a16="http://schemas.microsoft.com/office/drawing/2014/main" id="{A0C10BA0-6FEE-4895-8140-7E4A951CC9FD}"/>
-              </a:ext>
-            </a:extLst>
-          </p:cNvPr>
-          <p:cNvSpPr>
-            <a:spLocks noGrp="1"/>
-          </p:cNvSpPr>
-          <p:nvPr>
-            <p:ph type="title"/>
-          </p:nvPr>
-        </p:nvSpPr>
-        <p:spPr/>
-        <p:txBody>
-          <a:bodyPr/>
-          <a:lstStyle/>
-          <a:p>
-            <a:r>
-              <a:rPr lang="en-US" b="1" dirty="0"/>
-              <a:t>Switch Costs</a:t>
-            </a:r>
-          </a:p>
-        </p:txBody>
-      </p:sp>
-      <p:sp>
-        <p:nvSpPr>
-          <p:cNvPr id="3" name="Content Placeholder 2">
-            <a:extLst>
-              <a:ext uri="{FF2B5EF4-FFF2-40B4-BE49-F238E27FC236}">
-                <a16:creationId xmlns:a16="http://schemas.microsoft.com/office/drawing/2014/main" id="{C59DDDEC-8AFA-4F60-A62D-7BDEF375EB72}"/>
-              </a:ext>
-            </a:extLst>
-          </p:cNvPr>
-          <p:cNvSpPr>
-            <a:spLocks noGrp="1"/>
-          </p:cNvSpPr>
-          <p:nvPr>
-            <p:ph idx="1"/>
-          </p:nvPr>
-        </p:nvSpPr>
-        <p:spPr>
-          <a:xfrm>
-            <a:off x="866441" y="2489200"/>
-            <a:ext cx="7836688" cy="3530600"/>
-          </a:xfrm>
-        </p:spPr>
-        <p:txBody>
-          <a:bodyPr>
-            <a:normAutofit/>
-          </a:bodyPr>
-          <a:lstStyle/>
-          <a:p>
-            <a:r>
-              <a:rPr lang="en-US" sz="2400" b="1" dirty="0">
-                <a:solidFill>
-                  <a:schemeClr val="accent1"/>
-                </a:solidFill>
-              </a:rPr>
-              <a:t>Local switch costs </a:t>
-            </a:r>
-            <a:r>
-              <a:rPr lang="en-US" sz="2400" dirty="0">
-                <a:solidFill>
-                  <a:schemeClr val="tx1"/>
-                </a:solidFill>
-              </a:rPr>
-              <a:t>– Comparison of trials within a switch block</a:t>
-            </a:r>
-            <a:endParaRPr lang="en-US" sz="2000" dirty="0">
-              <a:solidFill>
-                <a:schemeClr val="tx1"/>
-              </a:solidFill>
-              <a:highlight>
-                <a:srgbClr val="FFFF00"/>
-              </a:highlight>
-            </a:endParaRPr>
-          </a:p>
-          <a:p>
-            <a:r>
-              <a:rPr lang="en-US" sz="2400" b="1" dirty="0">
-                <a:solidFill>
-                  <a:schemeClr val="accent1"/>
-                </a:solidFill>
-              </a:rPr>
-              <a:t>Global switch costs </a:t>
-            </a:r>
-            <a:r>
-              <a:rPr lang="en-US" sz="2400" dirty="0">
-                <a:solidFill>
-                  <a:schemeClr val="tx1"/>
-                </a:solidFill>
-              </a:rPr>
-              <a:t>– Comparison of non-switch trials (within a switch block) to pure trials (i.e., non-switch blocks)</a:t>
-            </a:r>
-            <a:endParaRPr lang="en-US" sz="2400" dirty="0">
-              <a:highlight>
-                <a:srgbClr val="FFFF00"/>
-              </a:highlight>
-            </a:endParaRPr>
-          </a:p>
-        </p:txBody>
-      </p:sp>
-    </p:spTree>
-    <p:extLst>
-      <p:ext uri="{BB962C8B-B14F-4D97-AF65-F5344CB8AC3E}">
-        <p14:creationId xmlns:p14="http://schemas.microsoft.com/office/powerpoint/2010/main" val="1180177790"/>
-      </p:ext>
-    </p:extLst>
-  </p:cSld>
-  <p:clrMapOvr>
-    <a:masterClrMapping/>
-  </p:clrMapOvr>
-</p:sld>
-</file>
-
 <file path=ppt/slides/slide5.xml><?xml version="1.0" encoding="utf-8"?>
 <p:sld xmlns:a="http://schemas.openxmlformats.org/drawingml/2006/main" xmlns:r="http://schemas.openxmlformats.org/officeDocument/2006/relationships" xmlns:p="http://schemas.openxmlformats.org/presentationml/2006/main">
   <p:cSld>
@@ -5174,116 +7787,40 @@
           <a:chExt cx="0" cy="0"/>
         </a:xfrm>
       </p:grpSpPr>
-      <p:sp>
-        <p:nvSpPr>
-          <p:cNvPr id="2" name="Title 1">
+      <p:pic>
+        <p:nvPicPr>
+          <p:cNvPr id="3" name="Picture 2">
             <a:extLst>
               <a:ext uri="{FF2B5EF4-FFF2-40B4-BE49-F238E27FC236}">
-                <a16:creationId xmlns:a16="http://schemas.microsoft.com/office/drawing/2014/main" id="{A0C10BA0-6FEE-4895-8140-7E4A951CC9FD}"/>
+                <a16:creationId xmlns:a16="http://schemas.microsoft.com/office/drawing/2014/main" id="{5D8AE060-5083-47C9-B225-18F877328F7E}"/>
               </a:ext>
             </a:extLst>
           </p:cNvPr>
-          <p:cNvSpPr>
-            <a:spLocks noGrp="1"/>
-          </p:cNvSpPr>
-          <p:nvPr>
-            <p:ph type="title"/>
-          </p:nvPr>
-        </p:nvSpPr>
-        <p:spPr/>
-        <p:txBody>
-          <a:bodyPr/>
-          <a:lstStyle/>
-          <a:p>
-            <a:r>
-              <a:rPr lang="en-US" b="1" dirty="0"/>
-              <a:t>Switch Costs</a:t>
-            </a:r>
-          </a:p>
-        </p:txBody>
-      </p:sp>
-      <p:sp>
-        <p:nvSpPr>
-          <p:cNvPr id="3" name="Content Placeholder 2">
-            <a:extLst>
-              <a:ext uri="{FF2B5EF4-FFF2-40B4-BE49-F238E27FC236}">
-                <a16:creationId xmlns:a16="http://schemas.microsoft.com/office/drawing/2014/main" id="{C59DDDEC-8AFA-4F60-A62D-7BDEF375EB72}"/>
-              </a:ext>
-            </a:extLst>
-          </p:cNvPr>
-          <p:cNvSpPr>
-            <a:spLocks noGrp="1"/>
-          </p:cNvSpPr>
-          <p:nvPr>
-            <p:ph idx="1"/>
-          </p:nvPr>
-        </p:nvSpPr>
-        <p:spPr>
-          <a:xfrm>
-            <a:off x="866441" y="2489200"/>
-            <a:ext cx="7836688" cy="3530600"/>
-          </a:xfrm>
-        </p:spPr>
-        <p:txBody>
-          <a:bodyPr>
-            <a:normAutofit/>
-          </a:bodyPr>
-          <a:lstStyle/>
-          <a:p>
-            <a:r>
-              <a:rPr lang="en-US" sz="2400" b="1" dirty="0">
-                <a:solidFill>
-                  <a:schemeClr val="accent1"/>
-                </a:solidFill>
-              </a:rPr>
-              <a:t>Local switch costs </a:t>
-            </a:r>
-            <a:r>
-              <a:rPr lang="en-US" sz="2400" dirty="0">
-                <a:solidFill>
-                  <a:schemeClr val="tx1"/>
-                </a:solidFill>
-              </a:rPr>
-              <a:t>reflect task-set reconfiguration that arises from changing tasks across trials </a:t>
-            </a:r>
-            <a:endParaRPr lang="en-US" sz="2000" dirty="0">
-              <a:solidFill>
-                <a:schemeClr val="tx1"/>
-              </a:solidFill>
-              <a:highlight>
-                <a:srgbClr val="FFFF00"/>
-              </a:highlight>
-            </a:endParaRPr>
-          </a:p>
-          <a:p>
-            <a:r>
-              <a:rPr lang="en-US" sz="2400" b="1" dirty="0">
-                <a:solidFill>
-                  <a:schemeClr val="accent1"/>
-                </a:solidFill>
-              </a:rPr>
-              <a:t>Global switch costs </a:t>
-            </a:r>
-            <a:r>
-              <a:rPr lang="en-US" sz="2400" dirty="0">
-                <a:solidFill>
-                  <a:schemeClr val="tx1"/>
-                </a:solidFill>
-              </a:rPr>
-              <a:t>represent the cost of actively maintaining two different tasks sets relative to only having to perform a single task.</a:t>
-            </a:r>
-            <a:endParaRPr lang="en-US" sz="2400" dirty="0">
-              <a:highlight>
-                <a:srgbClr val="FFFF00"/>
-              </a:highlight>
-            </a:endParaRPr>
-          </a:p>
-        </p:txBody>
-      </p:sp>
+          <p:cNvPicPr>
+            <a:picLocks noChangeAspect="1"/>
+          </p:cNvPicPr>
+          <p:nvPr/>
+        </p:nvPicPr>
+        <p:blipFill>
+          <a:blip r:embed="rId2"/>
+          <a:stretch>
+            <a:fillRect/>
+          </a:stretch>
+        </p:blipFill>
+        <p:spPr>
+          <a:xfrm>
+            <a:off x="0" y="360365"/>
+            <a:ext cx="9144000" cy="6137269"/>
+          </a:xfrm>
+          <a:prstGeom prst="rect">
+            <a:avLst/>
+          </a:prstGeom>
+        </p:spPr>
+      </p:pic>
     </p:spTree>
     <p:extLst>
       <p:ext uri="{BB962C8B-B14F-4D97-AF65-F5344CB8AC3E}">
-        <p14:creationId xmlns:p14="http://schemas.microsoft.com/office/powerpoint/2010/main" val="2085614677"/>
+        <p14:creationId xmlns:p14="http://schemas.microsoft.com/office/powerpoint/2010/main" val="1570445856"/>
       </p:ext>
     </p:extLst>
   </p:cSld>
@@ -5325,15 +7862,20 @@
           <p:nvPr/>
         </p:nvPicPr>
         <p:blipFill>
-          <a:blip r:embed="rId2"/>
-          <a:stretch>
-            <a:fillRect/>
-          </a:stretch>
+          <a:blip r:embed="rId2">
+            <a:extLst>
+              <a:ext uri="{28A0092B-C50C-407E-A947-70E740481C1C}">
+                <a14:useLocalDpi xmlns:a14="http://schemas.microsoft.com/office/drawing/2010/main" val="0"/>
+              </a:ext>
+            </a:extLst>
+          </a:blip>
+          <a:srcRect/>
+          <a:stretch/>
         </p:blipFill>
         <p:spPr>
           <a:xfrm>
-            <a:off x="0" y="360365"/>
-            <a:ext cx="9144000" cy="6137269"/>
+            <a:off x="0" y="558311"/>
+            <a:ext cx="9144000" cy="5741377"/>
           </a:xfrm>
           <a:prstGeom prst="rect">
             <a:avLst/>
@@ -5343,7 +7885,7 @@
     </p:spTree>
     <p:extLst>
       <p:ext uri="{BB962C8B-B14F-4D97-AF65-F5344CB8AC3E}">
-        <p14:creationId xmlns:p14="http://schemas.microsoft.com/office/powerpoint/2010/main" val="1570445856"/>
+        <p14:creationId xmlns:p14="http://schemas.microsoft.com/office/powerpoint/2010/main" val="3868886785"/>
       </p:ext>
     </p:extLst>
   </p:cSld>
@@ -5397,8 +7939,8 @@
         </p:blipFill>
         <p:spPr>
           <a:xfrm>
-            <a:off x="0" y="558311"/>
-            <a:ext cx="9144000" cy="5741377"/>
+            <a:off x="122854" y="558311"/>
+            <a:ext cx="8898292" cy="5741377"/>
           </a:xfrm>
           <a:prstGeom prst="rect">
             <a:avLst/>
@@ -5408,7 +7950,7 @@
     </p:spTree>
     <p:extLst>
       <p:ext uri="{BB962C8B-B14F-4D97-AF65-F5344CB8AC3E}">
-        <p14:creationId xmlns:p14="http://schemas.microsoft.com/office/powerpoint/2010/main" val="3868886785"/>
+        <p14:creationId xmlns:p14="http://schemas.microsoft.com/office/powerpoint/2010/main" val="4169195831"/>
       </p:ext>
     </p:extLst>
   </p:cSld>
@@ -5462,8 +8004,8 @@
         </p:blipFill>
         <p:spPr>
           <a:xfrm>
-            <a:off x="122854" y="558311"/>
-            <a:ext cx="8898292" cy="5741377"/>
+            <a:off x="10599" y="558311"/>
+            <a:ext cx="9122801" cy="5741377"/>
           </a:xfrm>
           <a:prstGeom prst="rect">
             <a:avLst/>
@@ -5473,7 +8015,7 @@
     </p:spTree>
     <p:extLst>
       <p:ext uri="{BB962C8B-B14F-4D97-AF65-F5344CB8AC3E}">
-        <p14:creationId xmlns:p14="http://schemas.microsoft.com/office/powerpoint/2010/main" val="4169195831"/>
+        <p14:creationId xmlns:p14="http://schemas.microsoft.com/office/powerpoint/2010/main" val="1886577070"/>
       </p:ext>
     </p:extLst>
   </p:cSld>
@@ -5502,10 +8044,10 @@
       </p:grpSpPr>
       <p:pic>
         <p:nvPicPr>
-          <p:cNvPr id="3" name="Picture 2">
+          <p:cNvPr id="5" name="Picture 4" descr="Chart&#10;&#10;Description automatically generated">
             <a:extLst>
               <a:ext uri="{FF2B5EF4-FFF2-40B4-BE49-F238E27FC236}">
-                <a16:creationId xmlns:a16="http://schemas.microsoft.com/office/drawing/2014/main" id="{5D8AE060-5083-47C9-B225-18F877328F7E}"/>
+                <a16:creationId xmlns:a16="http://schemas.microsoft.com/office/drawing/2014/main" id="{011E5029-70C3-4B0F-B1CA-0B15B87BE8F9}"/>
               </a:ext>
             </a:extLst>
           </p:cNvPr>
@@ -5522,23 +8064,64 @@
               </a:ext>
             </a:extLst>
           </a:blip>
-          <a:srcRect/>
-          <a:stretch/>
+          <a:stretch>
+            <a:fillRect/>
+          </a:stretch>
         </p:blipFill>
         <p:spPr>
           <a:xfrm>
-            <a:off x="10599" y="558311"/>
-            <a:ext cx="9122801" cy="5741377"/>
+            <a:off x="0" y="652652"/>
+            <a:ext cx="9144000" cy="6330461"/>
           </a:xfrm>
           <a:prstGeom prst="rect">
             <a:avLst/>
           </a:prstGeom>
         </p:spPr>
       </p:pic>
+      <p:sp>
+        <p:nvSpPr>
+          <p:cNvPr id="6" name="TextBox 5">
+            <a:extLst>
+              <a:ext uri="{FF2B5EF4-FFF2-40B4-BE49-F238E27FC236}">
+                <a16:creationId xmlns:a16="http://schemas.microsoft.com/office/drawing/2014/main" id="{A34046AC-7595-46B3-BA4B-2EC49B1966E6}"/>
+              </a:ext>
+            </a:extLst>
+          </p:cNvPr>
+          <p:cNvSpPr txBox="1"/>
+          <p:nvPr/>
+        </p:nvSpPr>
+        <p:spPr>
+          <a:xfrm>
+            <a:off x="2554015" y="221727"/>
+            <a:ext cx="5171089" cy="523220"/>
+          </a:xfrm>
+          <a:prstGeom prst="rect">
+            <a:avLst/>
+          </a:prstGeom>
+          <a:noFill/>
+        </p:spPr>
+        <p:txBody>
+          <a:bodyPr wrap="square" rtlCol="0">
+            <a:spAutoFit/>
+          </a:bodyPr>
+          <a:lstStyle/>
+          <a:p>
+            <a:r>
+              <a:rPr lang="en-US" sz="2800" b="1" dirty="0"/>
+              <a:t>Younger Adult </a:t>
+            </a:r>
+            <a:r>
+              <a:rPr lang="en-US" sz="2800" b="1" dirty="0" err="1"/>
+              <a:t>Vincentiles</a:t>
+            </a:r>
+            <a:endParaRPr lang="en-US" sz="2800" b="1" dirty="0"/>
+          </a:p>
+        </p:txBody>
+      </p:sp>
     </p:spTree>
     <p:extLst>
       <p:ext uri="{BB962C8B-B14F-4D97-AF65-F5344CB8AC3E}">
-        <p14:creationId xmlns:p14="http://schemas.microsoft.com/office/powerpoint/2010/main" val="1886577070"/>
+        <p14:creationId xmlns:p14="http://schemas.microsoft.com/office/powerpoint/2010/main" val="937046088"/>
       </p:ext>
     </p:extLst>
   </p:cSld>

</xml_diff>